<commit_message>
Mathematically relating power and prob
</commit_message>
<xml_diff>
--- a/Defining power.pptx
+++ b/Defining power.pptx
@@ -9,6 +9,16 @@
     <p:sldId id="257" r:id="rId3"/>
     <p:sldId id="258" r:id="rId4"/>
     <p:sldId id="259" r:id="rId5"/>
+    <p:sldId id="260" r:id="rId6"/>
+    <p:sldId id="261" r:id="rId7"/>
+    <p:sldId id="262" r:id="rId8"/>
+    <p:sldId id="263" r:id="rId9"/>
+    <p:sldId id="264" r:id="rId10"/>
+    <p:sldId id="265" r:id="rId11"/>
+    <p:sldId id="266" r:id="rId12"/>
+    <p:sldId id="267" r:id="rId13"/>
+    <p:sldId id="268" r:id="rId14"/>
+    <p:sldId id="269" r:id="rId15"/>
   </p:sldIdLst>
   <p:sldSz cx="12192000" cy="6858000"/>
   <p:notesSz cx="6858000" cy="9144000"/>
@@ -107,6 +117,11 @@
       </a:defRPr>
     </a:lvl9pPr>
   </p:defaultTextStyle>
+  <p:extLst>
+    <p:ext uri="{EFAFB233-063F-42B5-8137-9DF3F51BA10A}">
+      <p15:sldGuideLst xmlns:p15="http://schemas.microsoft.com/office/powerpoint/2012/main"/>
+    </p:ext>
+  </p:extLst>
 </p:presentation>
 </file>
 
@@ -152,10 +167,9 @@
           </a:lstStyle>
           <a:p>
             <a:r>
-              <a:rPr lang="en-US" smtClean="0"/>
+              <a:rPr lang="en-US"/>
               <a:t>Click to edit Master title style</a:t>
             </a:r>
-            <a:endParaRPr lang="en-US"/>
           </a:p>
         </p:txBody>
       </p:sp>
@@ -217,10 +231,9 @@
           </a:lstStyle>
           <a:p>
             <a:r>
-              <a:rPr lang="en-US" smtClean="0"/>
+              <a:rPr lang="en-US"/>
               <a:t>Click to edit Master subtitle style</a:t>
             </a:r>
-            <a:endParaRPr lang="en-US"/>
           </a:p>
         </p:txBody>
       </p:sp>
@@ -241,7 +254,7 @@
           <a:p>
             <a:fld id="{3903EDE9-DDC7-45B7-B19E-016742CB88DD}" type="datetimeFigureOut">
               <a:rPr lang="en-US" smtClean="0"/>
-              <a:t>8/31/2018</a:t>
+              <a:t>9/1/2018</a:t>
             </a:fld>
             <a:endParaRPr lang="en-US"/>
           </a:p>
@@ -335,10 +348,9 @@
           <a:lstStyle/>
           <a:p>
             <a:r>
-              <a:rPr lang="en-US" smtClean="0"/>
+              <a:rPr lang="en-US"/>
               <a:t>Click to edit Master title style</a:t>
             </a:r>
-            <a:endParaRPr lang="en-US"/>
           </a:p>
         </p:txBody>
       </p:sp>
@@ -359,38 +371,37 @@
           <a:p>
             <a:pPr lvl="0"/>
             <a:r>
-              <a:rPr lang="en-US" smtClean="0"/>
+              <a:rPr lang="en-US"/>
               <a:t>Edit Master text styles</a:t>
             </a:r>
           </a:p>
           <a:p>
             <a:pPr lvl="1"/>
             <a:r>
-              <a:rPr lang="en-US" smtClean="0"/>
+              <a:rPr lang="en-US"/>
               <a:t>Second level</a:t>
             </a:r>
           </a:p>
           <a:p>
             <a:pPr lvl="2"/>
             <a:r>
-              <a:rPr lang="en-US" smtClean="0"/>
+              <a:rPr lang="en-US"/>
               <a:t>Third level</a:t>
             </a:r>
           </a:p>
           <a:p>
             <a:pPr lvl="3"/>
             <a:r>
-              <a:rPr lang="en-US" smtClean="0"/>
+              <a:rPr lang="en-US"/>
               <a:t>Fourth level</a:t>
             </a:r>
           </a:p>
           <a:p>
             <a:pPr lvl="4"/>
             <a:r>
-              <a:rPr lang="en-US" smtClean="0"/>
+              <a:rPr lang="en-US"/>
               <a:t>Fifth level</a:t>
             </a:r>
-            <a:endParaRPr lang="en-US"/>
           </a:p>
         </p:txBody>
       </p:sp>
@@ -411,7 +422,7 @@
           <a:p>
             <a:fld id="{3903EDE9-DDC7-45B7-B19E-016742CB88DD}" type="datetimeFigureOut">
               <a:rPr lang="en-US" smtClean="0"/>
-              <a:t>8/31/2018</a:t>
+              <a:t>9/1/2018</a:t>
             </a:fld>
             <a:endParaRPr lang="en-US"/>
           </a:p>
@@ -510,10 +521,9 @@
           <a:lstStyle/>
           <a:p>
             <a:r>
-              <a:rPr lang="en-US" smtClean="0"/>
+              <a:rPr lang="en-US"/>
               <a:t>Click to edit Master title style</a:t>
             </a:r>
-            <a:endParaRPr lang="en-US"/>
           </a:p>
         </p:txBody>
       </p:sp>
@@ -539,38 +549,37 @@
           <a:p>
             <a:pPr lvl="0"/>
             <a:r>
-              <a:rPr lang="en-US" smtClean="0"/>
+              <a:rPr lang="en-US"/>
               <a:t>Edit Master text styles</a:t>
             </a:r>
           </a:p>
           <a:p>
             <a:pPr lvl="1"/>
             <a:r>
-              <a:rPr lang="en-US" smtClean="0"/>
+              <a:rPr lang="en-US"/>
               <a:t>Second level</a:t>
             </a:r>
           </a:p>
           <a:p>
             <a:pPr lvl="2"/>
             <a:r>
-              <a:rPr lang="en-US" smtClean="0"/>
+              <a:rPr lang="en-US"/>
               <a:t>Third level</a:t>
             </a:r>
           </a:p>
           <a:p>
             <a:pPr lvl="3"/>
             <a:r>
-              <a:rPr lang="en-US" smtClean="0"/>
+              <a:rPr lang="en-US"/>
               <a:t>Fourth level</a:t>
             </a:r>
           </a:p>
           <a:p>
             <a:pPr lvl="4"/>
             <a:r>
-              <a:rPr lang="en-US" smtClean="0"/>
+              <a:rPr lang="en-US"/>
               <a:t>Fifth level</a:t>
             </a:r>
-            <a:endParaRPr lang="en-US"/>
           </a:p>
         </p:txBody>
       </p:sp>
@@ -591,7 +600,7 @@
           <a:p>
             <a:fld id="{3903EDE9-DDC7-45B7-B19E-016742CB88DD}" type="datetimeFigureOut">
               <a:rPr lang="en-US" smtClean="0"/>
-              <a:t>8/31/2018</a:t>
+              <a:t>9/1/2018</a:t>
             </a:fld>
             <a:endParaRPr lang="en-US"/>
           </a:p>
@@ -685,10 +694,9 @@
           <a:lstStyle/>
           <a:p>
             <a:r>
-              <a:rPr lang="en-US" smtClean="0"/>
+              <a:rPr lang="en-US"/>
               <a:t>Click to edit Master title style</a:t>
             </a:r>
-            <a:endParaRPr lang="en-US"/>
           </a:p>
         </p:txBody>
       </p:sp>
@@ -709,38 +717,37 @@
           <a:p>
             <a:pPr lvl="0"/>
             <a:r>
-              <a:rPr lang="en-US" smtClean="0"/>
+              <a:rPr lang="en-US"/>
               <a:t>Edit Master text styles</a:t>
             </a:r>
           </a:p>
           <a:p>
             <a:pPr lvl="1"/>
             <a:r>
-              <a:rPr lang="en-US" smtClean="0"/>
+              <a:rPr lang="en-US"/>
               <a:t>Second level</a:t>
             </a:r>
           </a:p>
           <a:p>
             <a:pPr lvl="2"/>
             <a:r>
-              <a:rPr lang="en-US" smtClean="0"/>
+              <a:rPr lang="en-US"/>
               <a:t>Third level</a:t>
             </a:r>
           </a:p>
           <a:p>
             <a:pPr lvl="3"/>
             <a:r>
-              <a:rPr lang="en-US" smtClean="0"/>
+              <a:rPr lang="en-US"/>
               <a:t>Fourth level</a:t>
             </a:r>
           </a:p>
           <a:p>
             <a:pPr lvl="4"/>
             <a:r>
-              <a:rPr lang="en-US" smtClean="0"/>
+              <a:rPr lang="en-US"/>
               <a:t>Fifth level</a:t>
             </a:r>
-            <a:endParaRPr lang="en-US"/>
           </a:p>
         </p:txBody>
       </p:sp>
@@ -761,7 +768,7 @@
           <a:p>
             <a:fld id="{3903EDE9-DDC7-45B7-B19E-016742CB88DD}" type="datetimeFigureOut">
               <a:rPr lang="en-US" smtClean="0"/>
-              <a:t>8/31/2018</a:t>
+              <a:t>9/1/2018</a:t>
             </a:fld>
             <a:endParaRPr lang="en-US"/>
           </a:p>
@@ -864,10 +871,9 @@
           </a:lstStyle>
           <a:p>
             <a:r>
-              <a:rPr lang="en-US" smtClean="0"/>
+              <a:rPr lang="en-US"/>
               <a:t>Click to edit Master title style</a:t>
             </a:r>
-            <a:endParaRPr lang="en-US"/>
           </a:p>
         </p:txBody>
       </p:sp>
@@ -984,7 +990,7 @@
           <a:p>
             <a:pPr lvl="0"/>
             <a:r>
-              <a:rPr lang="en-US" smtClean="0"/>
+              <a:rPr lang="en-US"/>
               <a:t>Edit Master text styles</a:t>
             </a:r>
           </a:p>
@@ -1007,7 +1013,7 @@
           <a:p>
             <a:fld id="{3903EDE9-DDC7-45B7-B19E-016742CB88DD}" type="datetimeFigureOut">
               <a:rPr lang="en-US" smtClean="0"/>
-              <a:t>8/31/2018</a:t>
+              <a:t>9/1/2018</a:t>
             </a:fld>
             <a:endParaRPr lang="en-US"/>
           </a:p>
@@ -1101,10 +1107,9 @@
           <a:lstStyle/>
           <a:p>
             <a:r>
-              <a:rPr lang="en-US" smtClean="0"/>
+              <a:rPr lang="en-US"/>
               <a:t>Click to edit Master title style</a:t>
             </a:r>
-            <a:endParaRPr lang="en-US"/>
           </a:p>
         </p:txBody>
       </p:sp>
@@ -1130,38 +1135,37 @@
           <a:p>
             <a:pPr lvl="0"/>
             <a:r>
-              <a:rPr lang="en-US" smtClean="0"/>
+              <a:rPr lang="en-US"/>
               <a:t>Edit Master text styles</a:t>
             </a:r>
           </a:p>
           <a:p>
             <a:pPr lvl="1"/>
             <a:r>
-              <a:rPr lang="en-US" smtClean="0"/>
+              <a:rPr lang="en-US"/>
               <a:t>Second level</a:t>
             </a:r>
           </a:p>
           <a:p>
             <a:pPr lvl="2"/>
             <a:r>
-              <a:rPr lang="en-US" smtClean="0"/>
+              <a:rPr lang="en-US"/>
               <a:t>Third level</a:t>
             </a:r>
           </a:p>
           <a:p>
             <a:pPr lvl="3"/>
             <a:r>
-              <a:rPr lang="en-US" smtClean="0"/>
+              <a:rPr lang="en-US"/>
               <a:t>Fourth level</a:t>
             </a:r>
           </a:p>
           <a:p>
             <a:pPr lvl="4"/>
             <a:r>
-              <a:rPr lang="en-US" smtClean="0"/>
+              <a:rPr lang="en-US"/>
               <a:t>Fifth level</a:t>
             </a:r>
-            <a:endParaRPr lang="en-US"/>
           </a:p>
         </p:txBody>
       </p:sp>
@@ -1187,38 +1191,37 @@
           <a:p>
             <a:pPr lvl="0"/>
             <a:r>
-              <a:rPr lang="en-US" smtClean="0"/>
+              <a:rPr lang="en-US"/>
               <a:t>Edit Master text styles</a:t>
             </a:r>
           </a:p>
           <a:p>
             <a:pPr lvl="1"/>
             <a:r>
-              <a:rPr lang="en-US" smtClean="0"/>
+              <a:rPr lang="en-US"/>
               <a:t>Second level</a:t>
             </a:r>
           </a:p>
           <a:p>
             <a:pPr lvl="2"/>
             <a:r>
-              <a:rPr lang="en-US" smtClean="0"/>
+              <a:rPr lang="en-US"/>
               <a:t>Third level</a:t>
             </a:r>
           </a:p>
           <a:p>
             <a:pPr lvl="3"/>
             <a:r>
-              <a:rPr lang="en-US" smtClean="0"/>
+              <a:rPr lang="en-US"/>
               <a:t>Fourth level</a:t>
             </a:r>
           </a:p>
           <a:p>
             <a:pPr lvl="4"/>
             <a:r>
-              <a:rPr lang="en-US" smtClean="0"/>
+              <a:rPr lang="en-US"/>
               <a:t>Fifth level</a:t>
             </a:r>
-            <a:endParaRPr lang="en-US"/>
           </a:p>
         </p:txBody>
       </p:sp>
@@ -1239,7 +1242,7 @@
           <a:p>
             <a:fld id="{3903EDE9-DDC7-45B7-B19E-016742CB88DD}" type="datetimeFigureOut">
               <a:rPr lang="en-US" smtClean="0"/>
-              <a:t>8/31/2018</a:t>
+              <a:t>9/1/2018</a:t>
             </a:fld>
             <a:endParaRPr lang="en-US"/>
           </a:p>
@@ -1338,10 +1341,9 @@
           <a:lstStyle/>
           <a:p>
             <a:r>
-              <a:rPr lang="en-US" smtClean="0"/>
+              <a:rPr lang="en-US"/>
               <a:t>Click to edit Master title style</a:t>
             </a:r>
-            <a:endParaRPr lang="en-US"/>
           </a:p>
         </p:txBody>
       </p:sp>
@@ -1404,7 +1406,7 @@
           <a:p>
             <a:pPr lvl="0"/>
             <a:r>
-              <a:rPr lang="en-US" smtClean="0"/>
+              <a:rPr lang="en-US"/>
               <a:t>Edit Master text styles</a:t>
             </a:r>
           </a:p>
@@ -1432,38 +1434,37 @@
           <a:p>
             <a:pPr lvl="0"/>
             <a:r>
-              <a:rPr lang="en-US" smtClean="0"/>
+              <a:rPr lang="en-US"/>
               <a:t>Edit Master text styles</a:t>
             </a:r>
           </a:p>
           <a:p>
             <a:pPr lvl="1"/>
             <a:r>
-              <a:rPr lang="en-US" smtClean="0"/>
+              <a:rPr lang="en-US"/>
               <a:t>Second level</a:t>
             </a:r>
           </a:p>
           <a:p>
             <a:pPr lvl="2"/>
             <a:r>
-              <a:rPr lang="en-US" smtClean="0"/>
+              <a:rPr lang="en-US"/>
               <a:t>Third level</a:t>
             </a:r>
           </a:p>
           <a:p>
             <a:pPr lvl="3"/>
             <a:r>
-              <a:rPr lang="en-US" smtClean="0"/>
+              <a:rPr lang="en-US"/>
               <a:t>Fourth level</a:t>
             </a:r>
           </a:p>
           <a:p>
             <a:pPr lvl="4"/>
             <a:r>
-              <a:rPr lang="en-US" smtClean="0"/>
+              <a:rPr lang="en-US"/>
               <a:t>Fifth level</a:t>
             </a:r>
-            <a:endParaRPr lang="en-US"/>
           </a:p>
         </p:txBody>
       </p:sp>
@@ -1526,7 +1527,7 @@
           <a:p>
             <a:pPr lvl="0"/>
             <a:r>
-              <a:rPr lang="en-US" smtClean="0"/>
+              <a:rPr lang="en-US"/>
               <a:t>Edit Master text styles</a:t>
             </a:r>
           </a:p>
@@ -1554,38 +1555,37 @@
           <a:p>
             <a:pPr lvl="0"/>
             <a:r>
-              <a:rPr lang="en-US" smtClean="0"/>
+              <a:rPr lang="en-US"/>
               <a:t>Edit Master text styles</a:t>
             </a:r>
           </a:p>
           <a:p>
             <a:pPr lvl="1"/>
             <a:r>
-              <a:rPr lang="en-US" smtClean="0"/>
+              <a:rPr lang="en-US"/>
               <a:t>Second level</a:t>
             </a:r>
           </a:p>
           <a:p>
             <a:pPr lvl="2"/>
             <a:r>
-              <a:rPr lang="en-US" smtClean="0"/>
+              <a:rPr lang="en-US"/>
               <a:t>Third level</a:t>
             </a:r>
           </a:p>
           <a:p>
             <a:pPr lvl="3"/>
             <a:r>
-              <a:rPr lang="en-US" smtClean="0"/>
+              <a:rPr lang="en-US"/>
               <a:t>Fourth level</a:t>
             </a:r>
           </a:p>
           <a:p>
             <a:pPr lvl="4"/>
             <a:r>
-              <a:rPr lang="en-US" smtClean="0"/>
+              <a:rPr lang="en-US"/>
               <a:t>Fifth level</a:t>
             </a:r>
-            <a:endParaRPr lang="en-US"/>
           </a:p>
         </p:txBody>
       </p:sp>
@@ -1606,7 +1606,7 @@
           <a:p>
             <a:fld id="{3903EDE9-DDC7-45B7-B19E-016742CB88DD}" type="datetimeFigureOut">
               <a:rPr lang="en-US" smtClean="0"/>
-              <a:t>8/31/2018</a:t>
+              <a:t>9/1/2018</a:t>
             </a:fld>
             <a:endParaRPr lang="en-US"/>
           </a:p>
@@ -1700,10 +1700,9 @@
           <a:lstStyle/>
           <a:p>
             <a:r>
-              <a:rPr lang="en-US" smtClean="0"/>
+              <a:rPr lang="en-US"/>
               <a:t>Click to edit Master title style</a:t>
             </a:r>
-            <a:endParaRPr lang="en-US"/>
           </a:p>
         </p:txBody>
       </p:sp>
@@ -1724,7 +1723,7 @@
           <a:p>
             <a:fld id="{3903EDE9-DDC7-45B7-B19E-016742CB88DD}" type="datetimeFigureOut">
               <a:rPr lang="en-US" smtClean="0"/>
-              <a:t>8/31/2018</a:t>
+              <a:t>9/1/2018</a:t>
             </a:fld>
             <a:endParaRPr lang="en-US"/>
           </a:p>
@@ -1819,7 +1818,7 @@
           <a:p>
             <a:fld id="{3903EDE9-DDC7-45B7-B19E-016742CB88DD}" type="datetimeFigureOut">
               <a:rPr lang="en-US" smtClean="0"/>
-              <a:t>8/31/2018</a:t>
+              <a:t>9/1/2018</a:t>
             </a:fld>
             <a:endParaRPr lang="en-US"/>
           </a:p>
@@ -1922,10 +1921,9 @@
           </a:lstStyle>
           <a:p>
             <a:r>
-              <a:rPr lang="en-US" smtClean="0"/>
+              <a:rPr lang="en-US"/>
               <a:t>Click to edit Master title style</a:t>
             </a:r>
-            <a:endParaRPr lang="en-US"/>
           </a:p>
         </p:txBody>
       </p:sp>
@@ -1979,38 +1977,37 @@
           <a:p>
             <a:pPr lvl="0"/>
             <a:r>
-              <a:rPr lang="en-US" smtClean="0"/>
+              <a:rPr lang="en-US"/>
               <a:t>Edit Master text styles</a:t>
             </a:r>
           </a:p>
           <a:p>
             <a:pPr lvl="1"/>
             <a:r>
-              <a:rPr lang="en-US" smtClean="0"/>
+              <a:rPr lang="en-US"/>
               <a:t>Second level</a:t>
             </a:r>
           </a:p>
           <a:p>
             <a:pPr lvl="2"/>
             <a:r>
-              <a:rPr lang="en-US" smtClean="0"/>
+              <a:rPr lang="en-US"/>
               <a:t>Third level</a:t>
             </a:r>
           </a:p>
           <a:p>
             <a:pPr lvl="3"/>
             <a:r>
-              <a:rPr lang="en-US" smtClean="0"/>
+              <a:rPr lang="en-US"/>
               <a:t>Fourth level</a:t>
             </a:r>
           </a:p>
           <a:p>
             <a:pPr lvl="4"/>
             <a:r>
-              <a:rPr lang="en-US" smtClean="0"/>
+              <a:rPr lang="en-US"/>
               <a:t>Fifth level</a:t>
             </a:r>
-            <a:endParaRPr lang="en-US"/>
           </a:p>
         </p:txBody>
       </p:sp>
@@ -2073,7 +2070,7 @@
           <a:p>
             <a:pPr lvl="0"/>
             <a:r>
-              <a:rPr lang="en-US" smtClean="0"/>
+              <a:rPr lang="en-US"/>
               <a:t>Edit Master text styles</a:t>
             </a:r>
           </a:p>
@@ -2096,7 +2093,7 @@
           <a:p>
             <a:fld id="{3903EDE9-DDC7-45B7-B19E-016742CB88DD}" type="datetimeFigureOut">
               <a:rPr lang="en-US" smtClean="0"/>
-              <a:t>8/31/2018</a:t>
+              <a:t>9/1/2018</a:t>
             </a:fld>
             <a:endParaRPr lang="en-US"/>
           </a:p>
@@ -2199,10 +2196,9 @@
           </a:lstStyle>
           <a:p>
             <a:r>
-              <a:rPr lang="en-US" smtClean="0"/>
+              <a:rPr lang="en-US"/>
               <a:t>Click to edit Master title style</a:t>
             </a:r>
-            <a:endParaRPr lang="en-US"/>
           </a:p>
         </p:txBody>
       </p:sp>
@@ -2326,7 +2322,7 @@
           <a:p>
             <a:pPr lvl="0"/>
             <a:r>
-              <a:rPr lang="en-US" smtClean="0"/>
+              <a:rPr lang="en-US"/>
               <a:t>Edit Master text styles</a:t>
             </a:r>
           </a:p>
@@ -2349,7 +2345,7 @@
           <a:p>
             <a:fld id="{3903EDE9-DDC7-45B7-B19E-016742CB88DD}" type="datetimeFigureOut">
               <a:rPr lang="en-US" smtClean="0"/>
-              <a:t>8/31/2018</a:t>
+              <a:t>9/1/2018</a:t>
             </a:fld>
             <a:endParaRPr lang="en-US"/>
           </a:p>
@@ -2458,10 +2454,9 @@
           <a:lstStyle/>
           <a:p>
             <a:r>
-              <a:rPr lang="en-US" smtClean="0"/>
+              <a:rPr lang="en-US"/>
               <a:t>Click to edit Master title style</a:t>
             </a:r>
-            <a:endParaRPr lang="en-US"/>
           </a:p>
         </p:txBody>
       </p:sp>
@@ -2492,38 +2487,37 @@
           <a:p>
             <a:pPr lvl="0"/>
             <a:r>
-              <a:rPr lang="en-US" smtClean="0"/>
+              <a:rPr lang="en-US"/>
               <a:t>Edit Master text styles</a:t>
             </a:r>
           </a:p>
           <a:p>
             <a:pPr lvl="1"/>
             <a:r>
-              <a:rPr lang="en-US" smtClean="0"/>
+              <a:rPr lang="en-US"/>
               <a:t>Second level</a:t>
             </a:r>
           </a:p>
           <a:p>
             <a:pPr lvl="2"/>
             <a:r>
-              <a:rPr lang="en-US" smtClean="0"/>
+              <a:rPr lang="en-US"/>
               <a:t>Third level</a:t>
             </a:r>
           </a:p>
           <a:p>
             <a:pPr lvl="3"/>
             <a:r>
-              <a:rPr lang="en-US" smtClean="0"/>
+              <a:rPr lang="en-US"/>
               <a:t>Fourth level</a:t>
             </a:r>
           </a:p>
           <a:p>
             <a:pPr lvl="4"/>
             <a:r>
-              <a:rPr lang="en-US" smtClean="0"/>
+              <a:rPr lang="en-US"/>
               <a:t>Fifth level</a:t>
             </a:r>
-            <a:endParaRPr lang="en-US"/>
           </a:p>
         </p:txBody>
       </p:sp>
@@ -2562,7 +2556,7 @@
           <a:p>
             <a:fld id="{3903EDE9-DDC7-45B7-B19E-016742CB88DD}" type="datetimeFigureOut">
               <a:rPr lang="en-US" smtClean="0"/>
-              <a:t>8/31/2018</a:t>
+              <a:t>9/1/2018</a:t>
             </a:fld>
             <a:endParaRPr lang="en-US"/>
           </a:p>
@@ -2983,7 +2977,7 @@
         </p:blipFill>
         <p:spPr>
           <a:xfrm>
-            <a:off x="2803751" y="2512559"/>
+            <a:off x="2967037" y="1249816"/>
             <a:ext cx="5534706" cy="3949709"/>
           </a:xfrm>
           <a:prstGeom prst="rect">
@@ -3014,10 +3008,9 @@
           <a:lstStyle/>
           <a:p>
             <a:r>
-              <a:rPr lang="en-US" dirty="0" smtClean="0"/>
+              <a:rPr lang="en-US" dirty="0"/>
               <a:t>Varying the amplitude of a single 5 Hz drift oscillation</a:t>
             </a:r>
-            <a:endParaRPr lang="en-US" dirty="0"/>
           </a:p>
         </p:txBody>
       </p:sp>
@@ -3025,6 +3018,891 @@
     <p:extLst>
       <p:ext uri="{BB962C8B-B14F-4D97-AF65-F5344CB8AC3E}">
         <p14:creationId xmlns:p14="http://schemas.microsoft.com/office/powerpoint/2010/main" val="4078979841"/>
+      </p:ext>
+    </p:extLst>
+  </p:cSld>
+  <p:clrMapOvr>
+    <a:masterClrMapping/>
+  </p:clrMapOvr>
+</p:sld>
+</file>
+
+<file path=ppt/slides/slide10.xml><?xml version="1.0" encoding="utf-8"?>
+<p:sld xmlns:a="http://schemas.openxmlformats.org/drawingml/2006/main" xmlns:r="http://schemas.openxmlformats.org/officeDocument/2006/relationships" xmlns:p="http://schemas.openxmlformats.org/presentationml/2006/main">
+  <p:cSld>
+    <p:spTree>
+      <p:nvGrpSpPr>
+        <p:cNvPr id="1" name=""/>
+        <p:cNvGrpSpPr/>
+        <p:nvPr/>
+      </p:nvGrpSpPr>
+      <p:grpSpPr>
+        <a:xfrm>
+          <a:off x="0" y="0"/>
+          <a:ext cx="0" cy="0"/>
+          <a:chOff x="0" y="0"/>
+          <a:chExt cx="0" cy="0"/>
+        </a:xfrm>
+      </p:grpSpPr>
+      <p:sp>
+        <p:nvSpPr>
+          <p:cNvPr id="2" name="TextBox 1">
+            <a:extLst>
+              <a:ext uri="{FF2B5EF4-FFF2-40B4-BE49-F238E27FC236}">
+                <a16:creationId xmlns:a16="http://schemas.microsoft.com/office/drawing/2014/main" id="{5A4C6B65-DC88-457A-8230-2623BB341CDA}"/>
+              </a:ext>
+            </a:extLst>
+          </p:cNvPr>
+          <p:cNvSpPr txBox="1"/>
+          <p:nvPr/>
+        </p:nvSpPr>
+        <p:spPr>
+          <a:xfrm>
+            <a:off x="177800" y="330200"/>
+            <a:ext cx="3803651" cy="2862322"/>
+          </a:xfrm>
+          <a:prstGeom prst="rect">
+            <a:avLst/>
+          </a:prstGeom>
+          <a:noFill/>
+        </p:spPr>
+        <p:txBody>
+          <a:bodyPr wrap="square" rtlCol="0">
+            <a:spAutoFit/>
+          </a:bodyPr>
+          <a:lstStyle/>
+          <a:p>
+            <a:r>
+              <a:rPr lang="en-US" dirty="0"/>
+              <a:t>Let’s try instead seeing the relationship between maximum normalized power and drift amplitude/maximum probability for lower drift amplitudes</a:t>
+            </a:r>
+          </a:p>
+          <a:p>
+            <a:endParaRPr lang="en-US" dirty="0"/>
+          </a:p>
+          <a:p>
+            <a:r>
+              <a:rPr lang="en-US" dirty="0"/>
+              <a:t>This means applying fewer </a:t>
+            </a:r>
+            <a:r>
+              <a:rPr lang="en-US" dirty="0" err="1"/>
+              <a:t>Gx</a:t>
+            </a:r>
+            <a:r>
+              <a:rPr lang="en-US" dirty="0"/>
+              <a:t> gates and/or decreasing the oscillation amplitude, S.T. the 1-state probability never rotates past 1</a:t>
+            </a:r>
+          </a:p>
+        </p:txBody>
+      </p:sp>
+      <p:pic>
+        <p:nvPicPr>
+          <p:cNvPr id="3" name="Picture 2">
+            <a:extLst>
+              <a:ext uri="{FF2B5EF4-FFF2-40B4-BE49-F238E27FC236}">
+                <a16:creationId xmlns:a16="http://schemas.microsoft.com/office/drawing/2014/main" id="{4CF3A2FE-CF17-4AA1-AD34-1B87C9B2D6EE}"/>
+              </a:ext>
+            </a:extLst>
+          </p:cNvPr>
+          <p:cNvPicPr>
+            <a:picLocks noChangeAspect="1"/>
+          </p:cNvPicPr>
+          <p:nvPr/>
+        </p:nvPicPr>
+        <p:blipFill>
+          <a:blip r:embed="rId2"/>
+          <a:stretch>
+            <a:fillRect/>
+          </a:stretch>
+        </p:blipFill>
+        <p:spPr>
+          <a:xfrm>
+            <a:off x="3981451" y="666075"/>
+            <a:ext cx="4114800" cy="3028950"/>
+          </a:xfrm>
+          <a:prstGeom prst="rect">
+            <a:avLst/>
+          </a:prstGeom>
+        </p:spPr>
+      </p:pic>
+      <p:pic>
+        <p:nvPicPr>
+          <p:cNvPr id="4" name="Picture 3">
+            <a:extLst>
+              <a:ext uri="{FF2B5EF4-FFF2-40B4-BE49-F238E27FC236}">
+                <a16:creationId xmlns:a16="http://schemas.microsoft.com/office/drawing/2014/main" id="{8A50D1C7-68CE-4178-B147-77C584E27379}"/>
+              </a:ext>
+            </a:extLst>
+          </p:cNvPr>
+          <p:cNvPicPr>
+            <a:picLocks noChangeAspect="1"/>
+          </p:cNvPicPr>
+          <p:nvPr/>
+        </p:nvPicPr>
+        <p:blipFill>
+          <a:blip r:embed="rId3"/>
+          <a:stretch>
+            <a:fillRect/>
+          </a:stretch>
+        </p:blipFill>
+        <p:spPr>
+          <a:xfrm>
+            <a:off x="8210550" y="847050"/>
+            <a:ext cx="3981450" cy="2667000"/>
+          </a:xfrm>
+          <a:prstGeom prst="rect">
+            <a:avLst/>
+          </a:prstGeom>
+        </p:spPr>
+      </p:pic>
+      <p:pic>
+        <p:nvPicPr>
+          <p:cNvPr id="5" name="Picture 4">
+            <a:extLst>
+              <a:ext uri="{FF2B5EF4-FFF2-40B4-BE49-F238E27FC236}">
+                <a16:creationId xmlns:a16="http://schemas.microsoft.com/office/drawing/2014/main" id="{18E2E00C-85C4-4079-A714-8451ACBE7DF1}"/>
+              </a:ext>
+            </a:extLst>
+          </p:cNvPr>
+          <p:cNvPicPr>
+            <a:picLocks noChangeAspect="1"/>
+          </p:cNvPicPr>
+          <p:nvPr/>
+        </p:nvPicPr>
+        <p:blipFill>
+          <a:blip r:embed="rId4"/>
+          <a:stretch>
+            <a:fillRect/>
+          </a:stretch>
+        </p:blipFill>
+        <p:spPr>
+          <a:xfrm>
+            <a:off x="5622925" y="3695025"/>
+            <a:ext cx="3905250" cy="2828925"/>
+          </a:xfrm>
+          <a:prstGeom prst="rect">
+            <a:avLst/>
+          </a:prstGeom>
+        </p:spPr>
+      </p:pic>
+      <p:sp>
+        <p:nvSpPr>
+          <p:cNvPr id="6" name="TextBox 5">
+            <a:extLst>
+              <a:ext uri="{FF2B5EF4-FFF2-40B4-BE49-F238E27FC236}">
+                <a16:creationId xmlns:a16="http://schemas.microsoft.com/office/drawing/2014/main" id="{40381F81-BE65-4D7D-9A7D-2FF08AFD8FFF}"/>
+              </a:ext>
+            </a:extLst>
+          </p:cNvPr>
+          <p:cNvSpPr txBox="1"/>
+          <p:nvPr/>
+        </p:nvSpPr>
+        <p:spPr>
+          <a:xfrm>
+            <a:off x="9864724" y="3979625"/>
+            <a:ext cx="2136776" cy="2031325"/>
+          </a:xfrm>
+          <a:prstGeom prst="rect">
+            <a:avLst/>
+          </a:prstGeom>
+          <a:noFill/>
+        </p:spPr>
+        <p:txBody>
+          <a:bodyPr wrap="square" rtlCol="0">
+            <a:spAutoFit/>
+          </a:bodyPr>
+          <a:lstStyle/>
+          <a:p>
+            <a:r>
+              <a:rPr lang="en-US" dirty="0"/>
+              <a:t>This data all uses 2000 samples of Gx49.</a:t>
+            </a:r>
+          </a:p>
+          <a:p>
+            <a:endParaRPr lang="en-US" dirty="0"/>
+          </a:p>
+          <a:p>
+            <a:r>
+              <a:rPr lang="en-US" dirty="0"/>
+              <a:t>Each plotted power is an average of 4 experiments. </a:t>
+            </a:r>
+          </a:p>
+        </p:txBody>
+      </p:sp>
+    </p:spTree>
+    <p:extLst>
+      <p:ext uri="{BB962C8B-B14F-4D97-AF65-F5344CB8AC3E}">
+        <p14:creationId xmlns:p14="http://schemas.microsoft.com/office/powerpoint/2010/main" val="4094488136"/>
+      </p:ext>
+    </p:extLst>
+  </p:cSld>
+  <p:clrMapOvr>
+    <a:masterClrMapping/>
+  </p:clrMapOvr>
+</p:sld>
+</file>
+
+<file path=ppt/slides/slide11.xml><?xml version="1.0" encoding="utf-8"?>
+<p:sld xmlns:a="http://schemas.openxmlformats.org/drawingml/2006/main" xmlns:r="http://schemas.openxmlformats.org/officeDocument/2006/relationships" xmlns:p="http://schemas.openxmlformats.org/presentationml/2006/main">
+  <p:cSld>
+    <p:spTree>
+      <p:nvGrpSpPr>
+        <p:cNvPr id="1" name=""/>
+        <p:cNvGrpSpPr/>
+        <p:nvPr/>
+      </p:nvGrpSpPr>
+      <p:grpSpPr>
+        <a:xfrm>
+          <a:off x="0" y="0"/>
+          <a:ext cx="0" cy="0"/>
+          <a:chOff x="0" y="0"/>
+          <a:chExt cx="0" cy="0"/>
+        </a:xfrm>
+      </p:grpSpPr>
+      <p:sp>
+        <p:nvSpPr>
+          <p:cNvPr id="2" name="TextBox 1">
+            <a:extLst>
+              <a:ext uri="{FF2B5EF4-FFF2-40B4-BE49-F238E27FC236}">
+                <a16:creationId xmlns:a16="http://schemas.microsoft.com/office/drawing/2014/main" id="{606E03A1-52A2-49AC-A9AE-6DC020904912}"/>
+              </a:ext>
+            </a:extLst>
+          </p:cNvPr>
+          <p:cNvSpPr txBox="1"/>
+          <p:nvPr/>
+        </p:nvSpPr>
+        <p:spPr>
+          <a:xfrm>
+            <a:off x="939800" y="495300"/>
+            <a:ext cx="3352800" cy="1200329"/>
+          </a:xfrm>
+          <a:prstGeom prst="rect">
+            <a:avLst/>
+          </a:prstGeom>
+          <a:noFill/>
+        </p:spPr>
+        <p:txBody>
+          <a:bodyPr wrap="square" rtlCol="0">
+            <a:spAutoFit/>
+          </a:bodyPr>
+          <a:lstStyle/>
+          <a:p>
+            <a:r>
+              <a:rPr lang="en-US" dirty="0"/>
+              <a:t>Using Gx49 with 5000 samples, we get a similar relationship between 1-state probability and peak power</a:t>
+            </a:r>
+          </a:p>
+        </p:txBody>
+      </p:sp>
+      <p:pic>
+        <p:nvPicPr>
+          <p:cNvPr id="3" name="Picture 2">
+            <a:extLst>
+              <a:ext uri="{FF2B5EF4-FFF2-40B4-BE49-F238E27FC236}">
+                <a16:creationId xmlns:a16="http://schemas.microsoft.com/office/drawing/2014/main" id="{B477805B-890A-4C1C-B040-73D4937A6CC4}"/>
+              </a:ext>
+            </a:extLst>
+          </p:cNvPr>
+          <p:cNvPicPr>
+            <a:picLocks noChangeAspect="1"/>
+          </p:cNvPicPr>
+          <p:nvPr/>
+        </p:nvPicPr>
+        <p:blipFill>
+          <a:blip r:embed="rId2"/>
+          <a:stretch>
+            <a:fillRect/>
+          </a:stretch>
+        </p:blipFill>
+        <p:spPr>
+          <a:xfrm>
+            <a:off x="3981450" y="495300"/>
+            <a:ext cx="4229100" cy="3028950"/>
+          </a:xfrm>
+          <a:prstGeom prst="rect">
+            <a:avLst/>
+          </a:prstGeom>
+        </p:spPr>
+      </p:pic>
+      <p:pic>
+        <p:nvPicPr>
+          <p:cNvPr id="4" name="Picture 3">
+            <a:extLst>
+              <a:ext uri="{FF2B5EF4-FFF2-40B4-BE49-F238E27FC236}">
+                <a16:creationId xmlns:a16="http://schemas.microsoft.com/office/drawing/2014/main" id="{05E6E3DF-E312-4DE9-9A46-5697717DFD3C}"/>
+              </a:ext>
+            </a:extLst>
+          </p:cNvPr>
+          <p:cNvPicPr>
+            <a:picLocks noChangeAspect="1"/>
+          </p:cNvPicPr>
+          <p:nvPr/>
+        </p:nvPicPr>
+        <p:blipFill>
+          <a:blip r:embed="rId3"/>
+          <a:stretch>
+            <a:fillRect/>
+          </a:stretch>
+        </p:blipFill>
+        <p:spPr>
+          <a:xfrm>
+            <a:off x="8296275" y="771525"/>
+            <a:ext cx="3895725" cy="2847975"/>
+          </a:xfrm>
+          <a:prstGeom prst="rect">
+            <a:avLst/>
+          </a:prstGeom>
+        </p:spPr>
+      </p:pic>
+      <p:pic>
+        <p:nvPicPr>
+          <p:cNvPr id="5" name="Picture 4">
+            <a:extLst>
+              <a:ext uri="{FF2B5EF4-FFF2-40B4-BE49-F238E27FC236}">
+                <a16:creationId xmlns:a16="http://schemas.microsoft.com/office/drawing/2014/main" id="{0253812E-916A-4D5C-87CF-7EDC25D60915}"/>
+              </a:ext>
+            </a:extLst>
+          </p:cNvPr>
+          <p:cNvPicPr>
+            <a:picLocks noChangeAspect="1"/>
+          </p:cNvPicPr>
+          <p:nvPr/>
+        </p:nvPicPr>
+        <p:blipFill>
+          <a:blip r:embed="rId4"/>
+          <a:stretch>
+            <a:fillRect/>
+          </a:stretch>
+        </p:blipFill>
+        <p:spPr>
+          <a:xfrm>
+            <a:off x="5864225" y="3638550"/>
+            <a:ext cx="3943350" cy="2933700"/>
+          </a:xfrm>
+          <a:prstGeom prst="rect">
+            <a:avLst/>
+          </a:prstGeom>
+        </p:spPr>
+      </p:pic>
+    </p:spTree>
+    <p:extLst>
+      <p:ext uri="{BB962C8B-B14F-4D97-AF65-F5344CB8AC3E}">
+        <p14:creationId xmlns:p14="http://schemas.microsoft.com/office/powerpoint/2010/main" val="3487175686"/>
+      </p:ext>
+    </p:extLst>
+  </p:cSld>
+  <p:clrMapOvr>
+    <a:masterClrMapping/>
+  </p:clrMapOvr>
+</p:sld>
+</file>
+
+<file path=ppt/slides/slide12.xml><?xml version="1.0" encoding="utf-8"?>
+<p:sld xmlns:a="http://schemas.openxmlformats.org/drawingml/2006/main" xmlns:r="http://schemas.openxmlformats.org/officeDocument/2006/relationships" xmlns:p="http://schemas.openxmlformats.org/presentationml/2006/main">
+  <p:cSld>
+    <p:spTree>
+      <p:nvGrpSpPr>
+        <p:cNvPr id="1" name=""/>
+        <p:cNvGrpSpPr/>
+        <p:nvPr/>
+      </p:nvGrpSpPr>
+      <p:grpSpPr>
+        <a:xfrm>
+          <a:off x="0" y="0"/>
+          <a:ext cx="0" cy="0"/>
+          <a:chOff x="0" y="0"/>
+          <a:chExt cx="0" cy="0"/>
+        </a:xfrm>
+      </p:grpSpPr>
+      <p:sp>
+        <p:nvSpPr>
+          <p:cNvPr id="2" name="TextBox 1">
+            <a:extLst>
+              <a:ext uri="{FF2B5EF4-FFF2-40B4-BE49-F238E27FC236}">
+                <a16:creationId xmlns:a16="http://schemas.microsoft.com/office/drawing/2014/main" id="{68F30CDB-1522-46B2-B4D9-388675149436}"/>
+              </a:ext>
+            </a:extLst>
+          </p:cNvPr>
+          <p:cNvSpPr txBox="1"/>
+          <p:nvPr/>
+        </p:nvSpPr>
+        <p:spPr>
+          <a:xfrm>
+            <a:off x="838200" y="1282700"/>
+            <a:ext cx="2755900" cy="923330"/>
+          </a:xfrm>
+          <a:prstGeom prst="rect">
+            <a:avLst/>
+          </a:prstGeom>
+          <a:noFill/>
+        </p:spPr>
+        <p:txBody>
+          <a:bodyPr wrap="square" rtlCol="0">
+            <a:spAutoFit/>
+          </a:bodyPr>
+          <a:lstStyle/>
+          <a:p>
+            <a:r>
+              <a:rPr lang="en-US" dirty="0"/>
+              <a:t>With 8000 samples (though only averaged only 2 trials each for speed purposes)</a:t>
+            </a:r>
+          </a:p>
+        </p:txBody>
+      </p:sp>
+      <p:pic>
+        <p:nvPicPr>
+          <p:cNvPr id="3" name="Picture 2">
+            <a:extLst>
+              <a:ext uri="{FF2B5EF4-FFF2-40B4-BE49-F238E27FC236}">
+                <a16:creationId xmlns:a16="http://schemas.microsoft.com/office/drawing/2014/main" id="{83DFB0FF-97DE-4208-A609-5BB0E80BD134}"/>
+              </a:ext>
+            </a:extLst>
+          </p:cNvPr>
+          <p:cNvPicPr>
+            <a:picLocks noChangeAspect="1"/>
+          </p:cNvPicPr>
+          <p:nvPr/>
+        </p:nvPicPr>
+        <p:blipFill>
+          <a:blip r:embed="rId2"/>
+          <a:stretch>
+            <a:fillRect/>
+          </a:stretch>
+        </p:blipFill>
+        <p:spPr>
+          <a:xfrm>
+            <a:off x="3840164" y="636587"/>
+            <a:ext cx="4257675" cy="2943225"/>
+          </a:xfrm>
+          <a:prstGeom prst="rect">
+            <a:avLst/>
+          </a:prstGeom>
+        </p:spPr>
+      </p:pic>
+      <p:pic>
+        <p:nvPicPr>
+          <p:cNvPr id="4" name="Picture 3">
+            <a:extLst>
+              <a:ext uri="{FF2B5EF4-FFF2-40B4-BE49-F238E27FC236}">
+                <a16:creationId xmlns:a16="http://schemas.microsoft.com/office/drawing/2014/main" id="{2C2397C3-E442-4F77-AB82-BA25BABFCE70}"/>
+              </a:ext>
+            </a:extLst>
+          </p:cNvPr>
+          <p:cNvPicPr>
+            <a:picLocks noChangeAspect="1"/>
+          </p:cNvPicPr>
+          <p:nvPr/>
+        </p:nvPicPr>
+        <p:blipFill>
+          <a:blip r:embed="rId3"/>
+          <a:stretch>
+            <a:fillRect/>
+          </a:stretch>
+        </p:blipFill>
+        <p:spPr>
+          <a:xfrm>
+            <a:off x="8143875" y="703262"/>
+            <a:ext cx="4048125" cy="2876550"/>
+          </a:xfrm>
+          <a:prstGeom prst="rect">
+            <a:avLst/>
+          </a:prstGeom>
+        </p:spPr>
+      </p:pic>
+      <p:pic>
+        <p:nvPicPr>
+          <p:cNvPr id="5" name="Picture 4">
+            <a:extLst>
+              <a:ext uri="{FF2B5EF4-FFF2-40B4-BE49-F238E27FC236}">
+                <a16:creationId xmlns:a16="http://schemas.microsoft.com/office/drawing/2014/main" id="{D0A56CDC-2C06-4364-8FAB-108BC0AFFC3B}"/>
+              </a:ext>
+            </a:extLst>
+          </p:cNvPr>
+          <p:cNvPicPr>
+            <a:picLocks noChangeAspect="1"/>
+          </p:cNvPicPr>
+          <p:nvPr/>
+        </p:nvPicPr>
+        <p:blipFill>
+          <a:blip r:embed="rId4"/>
+          <a:stretch>
+            <a:fillRect/>
+          </a:stretch>
+        </p:blipFill>
+        <p:spPr>
+          <a:xfrm>
+            <a:off x="5640387" y="3684587"/>
+            <a:ext cx="4314825" cy="2943225"/>
+          </a:xfrm>
+          <a:prstGeom prst="rect">
+            <a:avLst/>
+          </a:prstGeom>
+        </p:spPr>
+      </p:pic>
+    </p:spTree>
+    <p:extLst>
+      <p:ext uri="{BB962C8B-B14F-4D97-AF65-F5344CB8AC3E}">
+        <p14:creationId xmlns:p14="http://schemas.microsoft.com/office/powerpoint/2010/main" val="1642841275"/>
+      </p:ext>
+    </p:extLst>
+  </p:cSld>
+  <p:clrMapOvr>
+    <a:masterClrMapping/>
+  </p:clrMapOvr>
+</p:sld>
+</file>
+
+<file path=ppt/slides/slide13.xml><?xml version="1.0" encoding="utf-8"?>
+<p:sld xmlns:a="http://schemas.openxmlformats.org/drawingml/2006/main" xmlns:r="http://schemas.openxmlformats.org/officeDocument/2006/relationships" xmlns:p="http://schemas.openxmlformats.org/presentationml/2006/main">
+  <p:cSld>
+    <p:spTree>
+      <p:nvGrpSpPr>
+        <p:cNvPr id="1" name=""/>
+        <p:cNvGrpSpPr/>
+        <p:nvPr/>
+      </p:nvGrpSpPr>
+      <p:grpSpPr>
+        <a:xfrm>
+          <a:off x="0" y="0"/>
+          <a:ext cx="0" cy="0"/>
+          <a:chOff x="0" y="0"/>
+          <a:chExt cx="0" cy="0"/>
+        </a:xfrm>
+      </p:grpSpPr>
+      <p:sp>
+        <p:nvSpPr>
+          <p:cNvPr id="2" name="TextBox 1">
+            <a:extLst>
+              <a:ext uri="{FF2B5EF4-FFF2-40B4-BE49-F238E27FC236}">
+                <a16:creationId xmlns:a16="http://schemas.microsoft.com/office/drawing/2014/main" id="{83502D3A-54EE-4A12-AA73-956BBCC2994C}"/>
+              </a:ext>
+            </a:extLst>
+          </p:cNvPr>
+          <p:cNvSpPr txBox="1"/>
+          <p:nvPr/>
+        </p:nvSpPr>
+        <p:spPr>
+          <a:xfrm>
+            <a:off x="1231900" y="673099"/>
+            <a:ext cx="3251200" cy="2308324"/>
+          </a:xfrm>
+          <a:prstGeom prst="rect">
+            <a:avLst/>
+          </a:prstGeom>
+          <a:noFill/>
+        </p:spPr>
+        <p:txBody>
+          <a:bodyPr wrap="square" rtlCol="0">
+            <a:spAutoFit/>
+          </a:bodyPr>
+          <a:lstStyle/>
+          <a:p>
+            <a:r>
+              <a:rPr lang="en-US" dirty="0"/>
+              <a:t>Let’s go back down to 2000x Gx49, but for 3 Hz with 0.005 amp. This should yield a smaller peak, but let’s see if the relationship still holds.</a:t>
+            </a:r>
+          </a:p>
+          <a:p>
+            <a:endParaRPr lang="en-US" dirty="0"/>
+          </a:p>
+          <a:p>
+            <a:r>
+              <a:rPr lang="en-US" dirty="0"/>
+              <a:t>I also used a larger step size for the amplitudes</a:t>
+            </a:r>
+          </a:p>
+        </p:txBody>
+      </p:sp>
+      <p:pic>
+        <p:nvPicPr>
+          <p:cNvPr id="3" name="Picture 2">
+            <a:extLst>
+              <a:ext uri="{FF2B5EF4-FFF2-40B4-BE49-F238E27FC236}">
+                <a16:creationId xmlns:a16="http://schemas.microsoft.com/office/drawing/2014/main" id="{49F783B6-E7F4-4AF4-A68D-F0D8CFDC0F7B}"/>
+              </a:ext>
+            </a:extLst>
+          </p:cNvPr>
+          <p:cNvPicPr>
+            <a:picLocks noChangeAspect="1"/>
+          </p:cNvPicPr>
+          <p:nvPr/>
+        </p:nvPicPr>
+        <p:blipFill>
+          <a:blip r:embed="rId2"/>
+          <a:stretch>
+            <a:fillRect/>
+          </a:stretch>
+        </p:blipFill>
+        <p:spPr>
+          <a:xfrm>
+            <a:off x="4622800" y="327074"/>
+            <a:ext cx="4048125" cy="3000375"/>
+          </a:xfrm>
+          <a:prstGeom prst="rect">
+            <a:avLst/>
+          </a:prstGeom>
+        </p:spPr>
+      </p:pic>
+      <p:sp>
+        <p:nvSpPr>
+          <p:cNvPr id="4" name="TextBox 3">
+            <a:extLst>
+              <a:ext uri="{FF2B5EF4-FFF2-40B4-BE49-F238E27FC236}">
+                <a16:creationId xmlns:a16="http://schemas.microsoft.com/office/drawing/2014/main" id="{A5542964-F30C-410B-BECF-9213C2043F4C}"/>
+              </a:ext>
+            </a:extLst>
+          </p:cNvPr>
+          <p:cNvSpPr txBox="1"/>
+          <p:nvPr/>
+        </p:nvSpPr>
+        <p:spPr>
+          <a:xfrm>
+            <a:off x="1371600" y="4371876"/>
+            <a:ext cx="3251200" cy="1477328"/>
+          </a:xfrm>
+          <a:prstGeom prst="rect">
+            <a:avLst/>
+          </a:prstGeom>
+          <a:noFill/>
+        </p:spPr>
+        <p:txBody>
+          <a:bodyPr wrap="square" rtlCol="0">
+            <a:spAutoFit/>
+          </a:bodyPr>
+          <a:lstStyle/>
+          <a:p>
+            <a:r>
+              <a:rPr lang="en-US" dirty="0"/>
+              <a:t>Looks like the front coefficient dropped a bit. Keep 2000x Gx49, but start with 0.009 amp. Keep the same amount of steps and step sizes in amplitude increase.</a:t>
+            </a:r>
+          </a:p>
+        </p:txBody>
+      </p:sp>
+      <p:pic>
+        <p:nvPicPr>
+          <p:cNvPr id="5" name="Picture 4">
+            <a:extLst>
+              <a:ext uri="{FF2B5EF4-FFF2-40B4-BE49-F238E27FC236}">
+                <a16:creationId xmlns:a16="http://schemas.microsoft.com/office/drawing/2014/main" id="{A753C3E9-2ECA-4178-AB00-501AF59EA3D6}"/>
+              </a:ext>
+            </a:extLst>
+          </p:cNvPr>
+          <p:cNvPicPr>
+            <a:picLocks noChangeAspect="1"/>
+          </p:cNvPicPr>
+          <p:nvPr/>
+        </p:nvPicPr>
+        <p:blipFill>
+          <a:blip r:embed="rId3"/>
+          <a:stretch>
+            <a:fillRect/>
+          </a:stretch>
+        </p:blipFill>
+        <p:spPr>
+          <a:xfrm>
+            <a:off x="4965700" y="3686175"/>
+            <a:ext cx="3886200" cy="3067050"/>
+          </a:xfrm>
+          <a:prstGeom prst="rect">
+            <a:avLst/>
+          </a:prstGeom>
+        </p:spPr>
+      </p:pic>
+    </p:spTree>
+    <p:extLst>
+      <p:ext uri="{BB962C8B-B14F-4D97-AF65-F5344CB8AC3E}">
+        <p14:creationId xmlns:p14="http://schemas.microsoft.com/office/powerpoint/2010/main" val="2607910065"/>
+      </p:ext>
+    </p:extLst>
+  </p:cSld>
+  <p:clrMapOvr>
+    <a:masterClrMapping/>
+  </p:clrMapOvr>
+</p:sld>
+</file>
+
+<file path=ppt/slides/slide14.xml><?xml version="1.0" encoding="utf-8"?>
+<p:sld xmlns:a="http://schemas.openxmlformats.org/drawingml/2006/main" xmlns:r="http://schemas.openxmlformats.org/officeDocument/2006/relationships" xmlns:p="http://schemas.openxmlformats.org/presentationml/2006/main">
+  <p:cSld>
+    <p:spTree>
+      <p:nvGrpSpPr>
+        <p:cNvPr id="1" name=""/>
+        <p:cNvGrpSpPr/>
+        <p:nvPr/>
+      </p:nvGrpSpPr>
+      <p:grpSpPr>
+        <a:xfrm>
+          <a:off x="0" y="0"/>
+          <a:ext cx="0" cy="0"/>
+          <a:chOff x="0" y="0"/>
+          <a:chExt cx="0" cy="0"/>
+        </a:xfrm>
+      </p:grpSpPr>
+      <p:sp>
+        <p:nvSpPr>
+          <p:cNvPr id="2" name="TextBox 1">
+            <a:extLst>
+              <a:ext uri="{FF2B5EF4-FFF2-40B4-BE49-F238E27FC236}">
+                <a16:creationId xmlns:a16="http://schemas.microsoft.com/office/drawing/2014/main" id="{A461B900-C3B7-4AB1-A81D-3CEBD549398D}"/>
+              </a:ext>
+            </a:extLst>
+          </p:cNvPr>
+          <p:cNvSpPr txBox="1"/>
+          <p:nvPr/>
+        </p:nvSpPr>
+        <p:spPr>
+          <a:xfrm>
+            <a:off x="711200" y="444500"/>
+            <a:ext cx="2717800" cy="1477328"/>
+          </a:xfrm>
+          <a:prstGeom prst="rect">
+            <a:avLst/>
+          </a:prstGeom>
+          <a:noFill/>
+        </p:spPr>
+        <p:txBody>
+          <a:bodyPr wrap="square" rtlCol="0">
+            <a:spAutoFit/>
+          </a:bodyPr>
+          <a:lstStyle/>
+          <a:p>
+            <a:r>
+              <a:rPr lang="en-US" dirty="0"/>
+              <a:t>Using fewer increases in amplitude didn’t take us all the way up to p = 1, so we got a different fit than usual.</a:t>
+            </a:r>
+          </a:p>
+        </p:txBody>
+      </p:sp>
+      <p:pic>
+        <p:nvPicPr>
+          <p:cNvPr id="3" name="Picture 2">
+            <a:extLst>
+              <a:ext uri="{FF2B5EF4-FFF2-40B4-BE49-F238E27FC236}">
+                <a16:creationId xmlns:a16="http://schemas.microsoft.com/office/drawing/2014/main" id="{CE8F9C03-23B9-4D53-A713-3DDB654EE0CD}"/>
+              </a:ext>
+            </a:extLst>
+          </p:cNvPr>
+          <p:cNvPicPr>
+            <a:picLocks noChangeAspect="1"/>
+          </p:cNvPicPr>
+          <p:nvPr/>
+        </p:nvPicPr>
+        <p:blipFill>
+          <a:blip r:embed="rId2"/>
+          <a:stretch>
+            <a:fillRect/>
+          </a:stretch>
+        </p:blipFill>
+        <p:spPr>
+          <a:xfrm>
+            <a:off x="3556000" y="187236"/>
+            <a:ext cx="4029075" cy="2971800"/>
+          </a:xfrm>
+          <a:prstGeom prst="rect">
+            <a:avLst/>
+          </a:prstGeom>
+        </p:spPr>
+      </p:pic>
+      <p:pic>
+        <p:nvPicPr>
+          <p:cNvPr id="4" name="Picture 3">
+            <a:extLst>
+              <a:ext uri="{FF2B5EF4-FFF2-40B4-BE49-F238E27FC236}">
+                <a16:creationId xmlns:a16="http://schemas.microsoft.com/office/drawing/2014/main" id="{9FBD4796-C544-46F8-A508-A74542489C7F}"/>
+              </a:ext>
+            </a:extLst>
+          </p:cNvPr>
+          <p:cNvPicPr>
+            <a:picLocks noChangeAspect="1"/>
+          </p:cNvPicPr>
+          <p:nvPr/>
+        </p:nvPicPr>
+        <p:blipFill>
+          <a:blip r:embed="rId3"/>
+          <a:stretch>
+            <a:fillRect/>
+          </a:stretch>
+        </p:blipFill>
+        <p:spPr>
+          <a:xfrm>
+            <a:off x="7712075" y="320586"/>
+            <a:ext cx="3895725" cy="2838450"/>
+          </a:xfrm>
+          <a:prstGeom prst="rect">
+            <a:avLst/>
+          </a:prstGeom>
+        </p:spPr>
+      </p:pic>
+      <p:sp>
+        <p:nvSpPr>
+          <p:cNvPr id="6" name="TextBox 5">
+            <a:extLst>
+              <a:ext uri="{FF2B5EF4-FFF2-40B4-BE49-F238E27FC236}">
+                <a16:creationId xmlns:a16="http://schemas.microsoft.com/office/drawing/2014/main" id="{33D95866-F714-4756-B7AC-BFBF0AACCD47}"/>
+              </a:ext>
+            </a:extLst>
+          </p:cNvPr>
+          <p:cNvSpPr txBox="1"/>
+          <p:nvPr/>
+        </p:nvSpPr>
+        <p:spPr>
+          <a:xfrm>
+            <a:off x="1257300" y="4737099"/>
+            <a:ext cx="2717800" cy="1200329"/>
+          </a:xfrm>
+          <a:prstGeom prst="rect">
+            <a:avLst/>
+          </a:prstGeom>
+          <a:noFill/>
+        </p:spPr>
+        <p:txBody>
+          <a:bodyPr wrap="square" rtlCol="0">
+            <a:spAutoFit/>
+          </a:bodyPr>
+          <a:lstStyle/>
+          <a:p>
+            <a:r>
+              <a:rPr lang="en-US" dirty="0"/>
+              <a:t>However, even with smaller amplitudes, using 7000 data points increased the first coefficient.</a:t>
+            </a:r>
+          </a:p>
+        </p:txBody>
+      </p:sp>
+      <p:pic>
+        <p:nvPicPr>
+          <p:cNvPr id="7" name="Picture 6">
+            <a:extLst>
+              <a:ext uri="{FF2B5EF4-FFF2-40B4-BE49-F238E27FC236}">
+                <a16:creationId xmlns:a16="http://schemas.microsoft.com/office/drawing/2014/main" id="{2959DBF3-9CAE-4283-A1C8-F18893D4A39B}"/>
+              </a:ext>
+            </a:extLst>
+          </p:cNvPr>
+          <p:cNvPicPr>
+            <a:picLocks noChangeAspect="1"/>
+          </p:cNvPicPr>
+          <p:nvPr/>
+        </p:nvPicPr>
+        <p:blipFill>
+          <a:blip r:embed="rId4"/>
+          <a:stretch>
+            <a:fillRect/>
+          </a:stretch>
+        </p:blipFill>
+        <p:spPr>
+          <a:xfrm>
+            <a:off x="3884612" y="3832314"/>
+            <a:ext cx="4143375" cy="3009900"/>
+          </a:xfrm>
+          <a:prstGeom prst="rect">
+            <a:avLst/>
+          </a:prstGeom>
+        </p:spPr>
+      </p:pic>
+    </p:spTree>
+    <p:extLst>
+      <p:ext uri="{BB962C8B-B14F-4D97-AF65-F5344CB8AC3E}">
+        <p14:creationId xmlns:p14="http://schemas.microsoft.com/office/powerpoint/2010/main" val="3443680523"/>
       </p:ext>
     </p:extLst>
   </p:cSld>
@@ -3074,10 +3952,9 @@
           <a:lstStyle/>
           <a:p>
             <a:r>
-              <a:rPr lang="en-US" dirty="0" smtClean="0"/>
+              <a:rPr lang="en-US" dirty="0"/>
               <a:t>Varying the number of samples for a 5 Hz, 0.008 amplitude oscillation with Gx49</a:t>
             </a:r>
-            <a:endParaRPr lang="en-US" dirty="0"/>
           </a:p>
         </p:txBody>
       </p:sp>
@@ -3254,7 +4131,7 @@
           <a:lstStyle/>
           <a:p>
             <a:r>
-              <a:rPr lang="en-US" dirty="0" smtClean="0"/>
+              <a:rPr lang="en-US" dirty="0"/>
               <a:t>Same settings, except I changed the frequency to 2 Hz.</a:t>
             </a:r>
           </a:p>
@@ -3263,7 +4140,7 @@
           </a:p>
           <a:p>
             <a:r>
-              <a:rPr lang="en-US" dirty="0" smtClean="0"/>
+              <a:rPr lang="en-US" dirty="0"/>
               <a:t>It still seems to center around 0.04 at longer samples…This may be because 2 Hz takes longer to appear in time.</a:t>
             </a:r>
           </a:p>
@@ -3272,10 +4149,9 @@
           </a:p>
           <a:p>
             <a:r>
-              <a:rPr lang="en-US" dirty="0" smtClean="0"/>
+              <a:rPr lang="en-US" dirty="0"/>
               <a:t>I want to try plots like these but with more trials per set of parameters. Are these wide fluctuations in normalized power just statistical and do they averaged out to something meaningful?</a:t>
             </a:r>
-            <a:endParaRPr lang="en-US" dirty="0"/>
           </a:p>
         </p:txBody>
       </p:sp>
@@ -3325,7 +4201,7 @@
         </p:blipFill>
         <p:spPr>
           <a:xfrm>
-            <a:off x="5977177" y="2014294"/>
+            <a:off x="6608357" y="1807466"/>
             <a:ext cx="4543425" cy="4219575"/>
           </a:xfrm>
           <a:prstGeom prst="rect">
@@ -3356,10 +4232,9 @@
           <a:lstStyle/>
           <a:p>
             <a:r>
-              <a:rPr lang="en-US" dirty="0" smtClean="0"/>
+              <a:rPr lang="en-US" dirty="0"/>
               <a:t>Lowered down to 0.5 Hz. The normalized power again seems to stabilize some more a longer sample numbers.</a:t>
             </a:r>
-            <a:endParaRPr lang="en-US" dirty="0"/>
           </a:p>
         </p:txBody>
       </p:sp>
@@ -3379,8 +4254,8 @@
         </p:blipFill>
         <p:spPr>
           <a:xfrm>
-            <a:off x="391550" y="2119070"/>
-            <a:ext cx="4972050" cy="4010025"/>
+            <a:off x="1179299" y="1807466"/>
+            <a:ext cx="4514659" cy="3641133"/>
           </a:xfrm>
           <a:prstGeom prst="rect">
             <a:avLst/>
@@ -3391,6 +4266,1506 @@
     <p:extLst>
       <p:ext uri="{BB962C8B-B14F-4D97-AF65-F5344CB8AC3E}">
         <p14:creationId xmlns:p14="http://schemas.microsoft.com/office/powerpoint/2010/main" val="4011377921"/>
+      </p:ext>
+    </p:extLst>
+  </p:cSld>
+  <p:clrMapOvr>
+    <a:masterClrMapping/>
+  </p:clrMapOvr>
+</p:sld>
+</file>
+
+<file path=ppt/slides/slide5.xml><?xml version="1.0" encoding="utf-8"?>
+<p:sld xmlns:a="http://schemas.openxmlformats.org/drawingml/2006/main" xmlns:r="http://schemas.openxmlformats.org/officeDocument/2006/relationships" xmlns:p="http://schemas.openxmlformats.org/presentationml/2006/main">
+  <p:cSld>
+    <p:spTree>
+      <p:nvGrpSpPr>
+        <p:cNvPr id="1" name=""/>
+        <p:cNvGrpSpPr/>
+        <p:nvPr/>
+      </p:nvGrpSpPr>
+      <p:grpSpPr>
+        <a:xfrm>
+          <a:off x="0" y="0"/>
+          <a:ext cx="0" cy="0"/>
+          <a:chOff x="0" y="0"/>
+          <a:chExt cx="0" cy="0"/>
+        </a:xfrm>
+      </p:grpSpPr>
+      <p:pic>
+        <p:nvPicPr>
+          <p:cNvPr id="3" name="Picture 2">
+            <a:extLst>
+              <a:ext uri="{FF2B5EF4-FFF2-40B4-BE49-F238E27FC236}">
+                <a16:creationId xmlns:a16="http://schemas.microsoft.com/office/drawing/2014/main" id="{1C60E984-8AB5-4205-A31C-22C21E848E12}"/>
+              </a:ext>
+            </a:extLst>
+          </p:cNvPr>
+          <p:cNvPicPr>
+            <a:picLocks noChangeAspect="1"/>
+          </p:cNvPicPr>
+          <p:nvPr/>
+        </p:nvPicPr>
+        <p:blipFill>
+          <a:blip r:embed="rId2"/>
+          <a:stretch>
+            <a:fillRect/>
+          </a:stretch>
+        </p:blipFill>
+        <p:spPr>
+          <a:xfrm>
+            <a:off x="388484" y="1808389"/>
+            <a:ext cx="4448175" cy="4743450"/>
+          </a:xfrm>
+          <a:prstGeom prst="rect">
+            <a:avLst/>
+          </a:prstGeom>
+        </p:spPr>
+      </p:pic>
+      <p:sp>
+        <p:nvSpPr>
+          <p:cNvPr id="4" name="TextBox 3">
+            <a:extLst>
+              <a:ext uri="{FF2B5EF4-FFF2-40B4-BE49-F238E27FC236}">
+                <a16:creationId xmlns:a16="http://schemas.microsoft.com/office/drawing/2014/main" id="{70F35E8C-C53D-4525-B67B-3BDA5ECFEEF5}"/>
+              </a:ext>
+            </a:extLst>
+          </p:cNvPr>
+          <p:cNvSpPr txBox="1"/>
+          <p:nvPr/>
+        </p:nvSpPr>
+        <p:spPr>
+          <a:xfrm>
+            <a:off x="6382431" y="1600200"/>
+            <a:ext cx="4786312" cy="3139321"/>
+          </a:xfrm>
+          <a:prstGeom prst="rect">
+            <a:avLst/>
+          </a:prstGeom>
+          <a:noFill/>
+        </p:spPr>
+        <p:txBody>
+          <a:bodyPr wrap="square" rtlCol="0">
+            <a:spAutoFit/>
+          </a:bodyPr>
+          <a:lstStyle/>
+          <a:p>
+            <a:r>
+              <a:rPr lang="en-US" dirty="0"/>
+              <a:t>Instead of just using one trial per parameter set and using the normalized spectrum from each, I used 6 trials per parameter set, over 12 parameter values, and looked at the average normalized peak power across the 6 trials.</a:t>
+            </a:r>
+          </a:p>
+          <a:p>
+            <a:endParaRPr lang="en-US" dirty="0"/>
+          </a:p>
+          <a:p>
+            <a:r>
+              <a:rPr lang="en-US" dirty="0"/>
+              <a:t>There seems to be a pretty steady 0.036 or .037-ish value.</a:t>
+            </a:r>
+          </a:p>
+          <a:p>
+            <a:endParaRPr lang="en-US" dirty="0"/>
+          </a:p>
+          <a:p>
+            <a:r>
+              <a:rPr lang="en-US" dirty="0"/>
+              <a:t>Just to check, let’s go back and try some different frequencies, but keep the amplitude the same.</a:t>
+            </a:r>
+          </a:p>
+        </p:txBody>
+      </p:sp>
+    </p:spTree>
+    <p:extLst>
+      <p:ext uri="{BB962C8B-B14F-4D97-AF65-F5344CB8AC3E}">
+        <p14:creationId xmlns:p14="http://schemas.microsoft.com/office/powerpoint/2010/main" val="3432039482"/>
+      </p:ext>
+    </p:extLst>
+  </p:cSld>
+  <p:clrMapOvr>
+    <a:masterClrMapping/>
+  </p:clrMapOvr>
+</p:sld>
+</file>
+
+<file path=ppt/slides/slide6.xml><?xml version="1.0" encoding="utf-8"?>
+<p:sld xmlns:a="http://schemas.openxmlformats.org/drawingml/2006/main" xmlns:r="http://schemas.openxmlformats.org/officeDocument/2006/relationships" xmlns:p="http://schemas.openxmlformats.org/presentationml/2006/main">
+  <p:cSld>
+    <p:spTree>
+      <p:nvGrpSpPr>
+        <p:cNvPr id="1" name=""/>
+        <p:cNvGrpSpPr/>
+        <p:nvPr/>
+      </p:nvGrpSpPr>
+      <p:grpSpPr>
+        <a:xfrm>
+          <a:off x="0" y="0"/>
+          <a:ext cx="0" cy="0"/>
+          <a:chOff x="0" y="0"/>
+          <a:chExt cx="0" cy="0"/>
+        </a:xfrm>
+      </p:grpSpPr>
+      <p:pic>
+        <p:nvPicPr>
+          <p:cNvPr id="2" name="Picture 1">
+            <a:extLst>
+              <a:ext uri="{FF2B5EF4-FFF2-40B4-BE49-F238E27FC236}">
+                <a16:creationId xmlns:a16="http://schemas.microsoft.com/office/drawing/2014/main" id="{DBDE99E0-18A2-4853-B307-BF5321FDE506}"/>
+              </a:ext>
+            </a:extLst>
+          </p:cNvPr>
+          <p:cNvPicPr>
+            <a:picLocks noChangeAspect="1"/>
+          </p:cNvPicPr>
+          <p:nvPr/>
+        </p:nvPicPr>
+        <p:blipFill>
+          <a:blip r:embed="rId2"/>
+          <a:stretch>
+            <a:fillRect/>
+          </a:stretch>
+        </p:blipFill>
+        <p:spPr>
+          <a:xfrm>
+            <a:off x="583746" y="1085850"/>
+            <a:ext cx="5734050" cy="4686300"/>
+          </a:xfrm>
+          <a:prstGeom prst="rect">
+            <a:avLst/>
+          </a:prstGeom>
+        </p:spPr>
+      </p:pic>
+      <p:pic>
+        <p:nvPicPr>
+          <p:cNvPr id="4" name="Picture 3">
+            <a:extLst>
+              <a:ext uri="{FF2B5EF4-FFF2-40B4-BE49-F238E27FC236}">
+                <a16:creationId xmlns:a16="http://schemas.microsoft.com/office/drawing/2014/main" id="{9BF1A080-A901-4FFB-A401-BACF47B76492}"/>
+              </a:ext>
+            </a:extLst>
+          </p:cNvPr>
+          <p:cNvPicPr>
+            <a:picLocks noChangeAspect="1"/>
+          </p:cNvPicPr>
+          <p:nvPr/>
+        </p:nvPicPr>
+        <p:blipFill>
+          <a:blip r:embed="rId3"/>
+          <a:stretch>
+            <a:fillRect/>
+          </a:stretch>
+        </p:blipFill>
+        <p:spPr>
+          <a:xfrm>
+            <a:off x="6917191" y="1085850"/>
+            <a:ext cx="4410075" cy="4667250"/>
+          </a:xfrm>
+          <a:prstGeom prst="rect">
+            <a:avLst/>
+          </a:prstGeom>
+        </p:spPr>
+      </p:pic>
+    </p:spTree>
+    <p:extLst>
+      <p:ext uri="{BB962C8B-B14F-4D97-AF65-F5344CB8AC3E}">
+        <p14:creationId xmlns:p14="http://schemas.microsoft.com/office/powerpoint/2010/main" val="3603764912"/>
+      </p:ext>
+    </p:extLst>
+  </p:cSld>
+  <p:clrMapOvr>
+    <a:masterClrMapping/>
+  </p:clrMapOvr>
+</p:sld>
+</file>
+
+<file path=ppt/slides/slide7.xml><?xml version="1.0" encoding="utf-8"?>
+<p:sld xmlns:a="http://schemas.openxmlformats.org/drawingml/2006/main" xmlns:r="http://schemas.openxmlformats.org/officeDocument/2006/relationships" xmlns:p="http://schemas.openxmlformats.org/presentationml/2006/main">
+  <p:cSld>
+    <p:spTree>
+      <p:nvGrpSpPr>
+        <p:cNvPr id="1" name=""/>
+        <p:cNvGrpSpPr/>
+        <p:nvPr/>
+      </p:nvGrpSpPr>
+      <p:grpSpPr>
+        <a:xfrm>
+          <a:off x="0" y="0"/>
+          <a:ext cx="0" cy="0"/>
+          <a:chOff x="0" y="0"/>
+          <a:chExt cx="0" cy="0"/>
+        </a:xfrm>
+      </p:grpSpPr>
+      <p:sp>
+        <p:nvSpPr>
+          <p:cNvPr id="2" name="TextBox 1">
+            <a:extLst>
+              <a:ext uri="{FF2B5EF4-FFF2-40B4-BE49-F238E27FC236}">
+                <a16:creationId xmlns:a16="http://schemas.microsoft.com/office/drawing/2014/main" id="{981945D3-1255-42C2-8072-BE0157CF5B6E}"/>
+              </a:ext>
+            </a:extLst>
+          </p:cNvPr>
+          <p:cNvSpPr txBox="1"/>
+          <p:nvPr/>
+        </p:nvSpPr>
+        <p:spPr>
+          <a:xfrm>
+            <a:off x="413658" y="903328"/>
+            <a:ext cx="4419599" cy="369332"/>
+          </a:xfrm>
+          <a:prstGeom prst="rect">
+            <a:avLst/>
+          </a:prstGeom>
+          <a:noFill/>
+        </p:spPr>
+        <p:txBody>
+          <a:bodyPr wrap="square" rtlCol="0">
+            <a:spAutoFit/>
+          </a:bodyPr>
+          <a:lstStyle/>
+          <a:p>
+            <a:r>
+              <a:rPr lang="en-US" dirty="0"/>
+              <a:t>Now try Gx29 with 5 Hz, and 0.006 amplitude</a:t>
+            </a:r>
+          </a:p>
+        </p:txBody>
+      </p:sp>
+      <p:pic>
+        <p:nvPicPr>
+          <p:cNvPr id="3" name="Picture 2">
+            <a:extLst>
+              <a:ext uri="{FF2B5EF4-FFF2-40B4-BE49-F238E27FC236}">
+                <a16:creationId xmlns:a16="http://schemas.microsoft.com/office/drawing/2014/main" id="{273C0B94-2557-4E50-A23A-5CAA1E6CAC2B}"/>
+              </a:ext>
+            </a:extLst>
+          </p:cNvPr>
+          <p:cNvPicPr>
+            <a:picLocks noChangeAspect="1"/>
+          </p:cNvPicPr>
+          <p:nvPr/>
+        </p:nvPicPr>
+        <p:blipFill>
+          <a:blip r:embed="rId2"/>
+          <a:stretch>
+            <a:fillRect/>
+          </a:stretch>
+        </p:blipFill>
+        <p:spPr>
+          <a:xfrm>
+            <a:off x="511629" y="1515835"/>
+            <a:ext cx="4572000" cy="4762500"/>
+          </a:xfrm>
+          <a:prstGeom prst="rect">
+            <a:avLst/>
+          </a:prstGeom>
+        </p:spPr>
+      </p:pic>
+      <p:pic>
+        <p:nvPicPr>
+          <p:cNvPr id="4" name="Picture 3">
+            <a:extLst>
+              <a:ext uri="{FF2B5EF4-FFF2-40B4-BE49-F238E27FC236}">
+                <a16:creationId xmlns:a16="http://schemas.microsoft.com/office/drawing/2014/main" id="{9FD54DDB-2AB9-40D9-94B0-FFBAD4787CAE}"/>
+              </a:ext>
+            </a:extLst>
+          </p:cNvPr>
+          <p:cNvPicPr>
+            <a:picLocks noChangeAspect="1"/>
+          </p:cNvPicPr>
+          <p:nvPr/>
+        </p:nvPicPr>
+        <p:blipFill>
+          <a:blip r:embed="rId3"/>
+          <a:stretch>
+            <a:fillRect/>
+          </a:stretch>
+        </p:blipFill>
+        <p:spPr>
+          <a:xfrm>
+            <a:off x="5630636" y="1634404"/>
+            <a:ext cx="4610100" cy="4733925"/>
+          </a:xfrm>
+          <a:prstGeom prst="rect">
+            <a:avLst/>
+          </a:prstGeom>
+        </p:spPr>
+      </p:pic>
+      <p:sp>
+        <p:nvSpPr>
+          <p:cNvPr id="6" name="TextBox 5">
+            <a:extLst>
+              <a:ext uri="{FF2B5EF4-FFF2-40B4-BE49-F238E27FC236}">
+                <a16:creationId xmlns:a16="http://schemas.microsoft.com/office/drawing/2014/main" id="{4DE64D94-1C90-428C-8068-16DF4E6C918E}"/>
+              </a:ext>
+            </a:extLst>
+          </p:cNvPr>
+          <p:cNvSpPr txBox="1"/>
+          <p:nvPr/>
+        </p:nvSpPr>
+        <p:spPr>
+          <a:xfrm>
+            <a:off x="5725886" y="903328"/>
+            <a:ext cx="5050971" cy="369332"/>
+          </a:xfrm>
+          <a:prstGeom prst="rect">
+            <a:avLst/>
+          </a:prstGeom>
+          <a:noFill/>
+        </p:spPr>
+        <p:txBody>
+          <a:bodyPr wrap="square" rtlCol="0">
+            <a:spAutoFit/>
+          </a:bodyPr>
+          <a:lstStyle/>
+          <a:p>
+            <a:r>
+              <a:rPr lang="en-US" dirty="0"/>
+              <a:t>Now try Gx29 with 1.2 Hz, and 0.006 amplitude</a:t>
+            </a:r>
+          </a:p>
+        </p:txBody>
+      </p:sp>
+    </p:spTree>
+    <p:extLst>
+      <p:ext uri="{BB962C8B-B14F-4D97-AF65-F5344CB8AC3E}">
+        <p14:creationId xmlns:p14="http://schemas.microsoft.com/office/powerpoint/2010/main" val="1461719102"/>
+      </p:ext>
+    </p:extLst>
+  </p:cSld>
+  <p:clrMapOvr>
+    <a:masterClrMapping/>
+  </p:clrMapOvr>
+</p:sld>
+</file>
+
+<file path=ppt/slides/slide8.xml><?xml version="1.0" encoding="utf-8"?>
+<p:sld xmlns:a="http://schemas.openxmlformats.org/drawingml/2006/main" xmlns:r="http://schemas.openxmlformats.org/officeDocument/2006/relationships" xmlns:p="http://schemas.openxmlformats.org/presentationml/2006/main">
+  <p:cSld>
+    <p:spTree>
+      <p:nvGrpSpPr>
+        <p:cNvPr id="1" name=""/>
+        <p:cNvGrpSpPr/>
+        <p:nvPr/>
+      </p:nvGrpSpPr>
+      <p:grpSpPr>
+        <a:xfrm>
+          <a:off x="0" y="0"/>
+          <a:ext cx="0" cy="0"/>
+          <a:chOff x="0" y="0"/>
+          <a:chExt cx="0" cy="0"/>
+        </a:xfrm>
+      </p:grpSpPr>
+      <p:graphicFrame>
+        <p:nvGraphicFramePr>
+          <p:cNvPr id="2" name="Table 1">
+            <a:extLst>
+              <a:ext uri="{FF2B5EF4-FFF2-40B4-BE49-F238E27FC236}">
+                <a16:creationId xmlns:a16="http://schemas.microsoft.com/office/drawing/2014/main" id="{66BF7380-B835-4475-9BAC-3F798653B9D4}"/>
+              </a:ext>
+            </a:extLst>
+          </p:cNvPr>
+          <p:cNvGraphicFramePr>
+            <a:graphicFrameLocks noGrp="1"/>
+          </p:cNvGraphicFramePr>
+          <p:nvPr>
+            <p:extLst>
+              <p:ext uri="{D42A27DB-BD31-4B8C-83A1-F6EECF244321}">
+                <p14:modId xmlns:p14="http://schemas.microsoft.com/office/powerpoint/2010/main" val="104323405"/>
+              </p:ext>
+            </p:extLst>
+          </p:nvPr>
+        </p:nvGraphicFramePr>
+        <p:xfrm>
+          <a:off x="751116" y="393094"/>
+          <a:ext cx="10613569" cy="4526280"/>
+        </p:xfrm>
+        <a:graphic>
+          <a:graphicData uri="http://schemas.openxmlformats.org/drawingml/2006/table">
+            <a:tbl>
+              <a:tblPr firstRow="1" bandRow="1">
+                <a:tableStyleId>{5C22544A-7EE6-4342-B048-85BDC9FD1C3A}</a:tableStyleId>
+              </a:tblPr>
+              <a:tblGrid>
+                <a:gridCol w="1536440">
+                  <a:extLst>
+                    <a:ext uri="{9D8B030D-6E8A-4147-A177-3AD203B41FA5}">
+                      <a16:colId xmlns:a16="http://schemas.microsoft.com/office/drawing/2014/main" val="1274777451"/>
+                    </a:ext>
+                  </a:extLst>
+                </a:gridCol>
+                <a:gridCol w="1489787">
+                  <a:extLst>
+                    <a:ext uri="{9D8B030D-6E8A-4147-A177-3AD203B41FA5}">
+                      <a16:colId xmlns:a16="http://schemas.microsoft.com/office/drawing/2014/main" val="3050315093"/>
+                    </a:ext>
+                  </a:extLst>
+                </a:gridCol>
+                <a:gridCol w="1186543">
+                  <a:extLst>
+                    <a:ext uri="{9D8B030D-6E8A-4147-A177-3AD203B41FA5}">
+                      <a16:colId xmlns:a16="http://schemas.microsoft.com/office/drawing/2014/main" val="1353192376"/>
+                    </a:ext>
+                  </a:extLst>
+                </a:gridCol>
+                <a:gridCol w="2337763">
+                  <a:extLst>
+                    <a:ext uri="{9D8B030D-6E8A-4147-A177-3AD203B41FA5}">
+                      <a16:colId xmlns:a16="http://schemas.microsoft.com/office/drawing/2014/main" val="3816899366"/>
+                    </a:ext>
+                  </a:extLst>
+                </a:gridCol>
+                <a:gridCol w="2493934">
+                  <a:extLst>
+                    <a:ext uri="{9D8B030D-6E8A-4147-A177-3AD203B41FA5}">
+                      <a16:colId xmlns:a16="http://schemas.microsoft.com/office/drawing/2014/main" val="3913804138"/>
+                    </a:ext>
+                  </a:extLst>
+                </a:gridCol>
+                <a:gridCol w="1569102">
+                  <a:extLst>
+                    <a:ext uri="{9D8B030D-6E8A-4147-A177-3AD203B41FA5}">
+                      <a16:colId xmlns:a16="http://schemas.microsoft.com/office/drawing/2014/main" val="2061934396"/>
+                    </a:ext>
+                  </a:extLst>
+                </a:gridCol>
+              </a:tblGrid>
+              <a:tr h="370840">
+                <a:tc>
+                  <a:txBody>
+                    <a:bodyPr/>
+                    <a:lstStyle/>
+                    <a:p>
+                      <a:r>
+                        <a:rPr lang="en-US" dirty="0"/>
+                        <a:t>Freq</a:t>
+                      </a:r>
+                    </a:p>
+                  </a:txBody>
+                  <a:tcPr/>
+                </a:tc>
+                <a:tc>
+                  <a:txBody>
+                    <a:bodyPr/>
+                    <a:lstStyle/>
+                    <a:p>
+                      <a:r>
+                        <a:rPr lang="en-US" dirty="0"/>
+                        <a:t>Applied Amplitude</a:t>
+                      </a:r>
+                    </a:p>
+                  </a:txBody>
+                  <a:tcPr/>
+                </a:tc>
+                <a:tc>
+                  <a:txBody>
+                    <a:bodyPr/>
+                    <a:lstStyle/>
+                    <a:p>
+                      <a:r>
+                        <a:rPr lang="en-US" dirty="0" err="1"/>
+                        <a:t>Gx</a:t>
+                      </a:r>
+                      <a:endParaRPr lang="en-US" dirty="0"/>
+                    </a:p>
+                  </a:txBody>
+                  <a:tcPr/>
+                </a:tc>
+                <a:tc>
+                  <a:txBody>
+                    <a:bodyPr/>
+                    <a:lstStyle/>
+                    <a:p>
+                      <a:r>
+                        <a:rPr lang="en-US" dirty="0"/>
+                        <a:t>Peak-to-Trough amplitude of |1&gt; state probability (after all </a:t>
+                      </a:r>
+                      <a:r>
+                        <a:rPr lang="en-US" dirty="0" err="1"/>
+                        <a:t>Gx</a:t>
+                      </a:r>
+                      <a:r>
+                        <a:rPr lang="en-US" dirty="0"/>
+                        <a:t> gates)</a:t>
+                      </a:r>
+                    </a:p>
+                  </a:txBody>
+                  <a:tcPr/>
+                </a:tc>
+                <a:tc>
+                  <a:txBody>
+                    <a:bodyPr/>
+                    <a:lstStyle/>
+                    <a:p>
+                      <a:r>
+                        <a:rPr lang="en-US" dirty="0"/>
+                        <a:t>Avg. Normalized Power (from various sample sizes)</a:t>
+                      </a:r>
+                    </a:p>
+                  </a:txBody>
+                  <a:tcPr/>
+                </a:tc>
+                <a:tc>
+                  <a:txBody>
+                    <a:bodyPr/>
+                    <a:lstStyle/>
+                    <a:p>
+                      <a:r>
+                        <a:rPr lang="en-US" dirty="0"/>
+                        <a:t>Std. Dev</a:t>
+                      </a:r>
+                    </a:p>
+                  </a:txBody>
+                  <a:tcPr/>
+                </a:tc>
+                <a:extLst>
+                  <a:ext uri="{0D108BD9-81ED-4DB2-BD59-A6C34878D82A}">
+                    <a16:rowId xmlns:a16="http://schemas.microsoft.com/office/drawing/2014/main" val="181224676"/>
+                  </a:ext>
+                </a:extLst>
+              </a:tr>
+              <a:tr h="370840">
+                <a:tc>
+                  <a:txBody>
+                    <a:bodyPr/>
+                    <a:lstStyle/>
+                    <a:p>
+                      <a:r>
+                        <a:rPr lang="en-US" dirty="0"/>
+                        <a:t>5</a:t>
+                      </a:r>
+                    </a:p>
+                  </a:txBody>
+                  <a:tcPr/>
+                </a:tc>
+                <a:tc>
+                  <a:txBody>
+                    <a:bodyPr/>
+                    <a:lstStyle/>
+                    <a:p>
+                      <a:r>
+                        <a:rPr lang="en-US" dirty="0"/>
+                        <a:t>0.006</a:t>
+                      </a:r>
+                    </a:p>
+                  </a:txBody>
+                  <a:tcPr/>
+                </a:tc>
+                <a:tc>
+                  <a:txBody>
+                    <a:bodyPr/>
+                    <a:lstStyle/>
+                    <a:p>
+                      <a:r>
+                        <a:rPr lang="en-US" dirty="0"/>
+                        <a:t>29</a:t>
+                      </a:r>
+                    </a:p>
+                  </a:txBody>
+                  <a:tcPr/>
+                </a:tc>
+                <a:tc>
+                  <a:txBody>
+                    <a:bodyPr/>
+                    <a:lstStyle/>
+                    <a:p>
+                      <a:r>
+                        <a:rPr lang="en-US" dirty="0"/>
+                        <a:t>0.17</a:t>
+                      </a:r>
+                    </a:p>
+                  </a:txBody>
+                  <a:tcPr/>
+                </a:tc>
+                <a:tc>
+                  <a:txBody>
+                    <a:bodyPr/>
+                    <a:lstStyle/>
+                    <a:p>
+                      <a:r>
+                        <a:rPr lang="en-US" dirty="0"/>
+                        <a:t>0.0086</a:t>
+                      </a:r>
+                    </a:p>
+                  </a:txBody>
+                  <a:tcPr/>
+                </a:tc>
+                <a:tc>
+                  <a:txBody>
+                    <a:bodyPr/>
+                    <a:lstStyle/>
+                    <a:p>
+                      <a:r>
+                        <a:rPr lang="en-US" dirty="0"/>
+                        <a:t>0.0012</a:t>
+                      </a:r>
+                    </a:p>
+                  </a:txBody>
+                  <a:tcPr/>
+                </a:tc>
+                <a:extLst>
+                  <a:ext uri="{0D108BD9-81ED-4DB2-BD59-A6C34878D82A}">
+                    <a16:rowId xmlns:a16="http://schemas.microsoft.com/office/drawing/2014/main" val="2553702458"/>
+                  </a:ext>
+                </a:extLst>
+              </a:tr>
+              <a:tr h="370840">
+                <a:tc>
+                  <a:txBody>
+                    <a:bodyPr/>
+                    <a:lstStyle/>
+                    <a:p>
+                      <a:r>
+                        <a:rPr lang="en-US" dirty="0"/>
+                        <a:t>1.2</a:t>
+                      </a:r>
+                    </a:p>
+                  </a:txBody>
+                  <a:tcPr/>
+                </a:tc>
+                <a:tc>
+                  <a:txBody>
+                    <a:bodyPr/>
+                    <a:lstStyle/>
+                    <a:p>
+                      <a:r>
+                        <a:rPr lang="en-US" dirty="0"/>
+                        <a:t>0.006</a:t>
+                      </a:r>
+                    </a:p>
+                  </a:txBody>
+                  <a:tcPr/>
+                </a:tc>
+                <a:tc>
+                  <a:txBody>
+                    <a:bodyPr/>
+                    <a:lstStyle/>
+                    <a:p>
+                      <a:r>
+                        <a:rPr lang="en-US" dirty="0"/>
+                        <a:t>29</a:t>
+                      </a:r>
+                    </a:p>
+                  </a:txBody>
+                  <a:tcPr/>
+                </a:tc>
+                <a:tc>
+                  <a:txBody>
+                    <a:bodyPr/>
+                    <a:lstStyle/>
+                    <a:p>
+                      <a:r>
+                        <a:rPr lang="en-US" dirty="0"/>
+                        <a:t>0.17</a:t>
+                      </a:r>
+                    </a:p>
+                  </a:txBody>
+                  <a:tcPr/>
+                </a:tc>
+                <a:tc>
+                  <a:txBody>
+                    <a:bodyPr/>
+                    <a:lstStyle/>
+                    <a:p>
+                      <a:r>
+                        <a:rPr lang="en-US" dirty="0"/>
+                        <a:t>0.0078</a:t>
+                      </a:r>
+                    </a:p>
+                  </a:txBody>
+                  <a:tcPr/>
+                </a:tc>
+                <a:tc>
+                  <a:txBody>
+                    <a:bodyPr/>
+                    <a:lstStyle/>
+                    <a:p>
+                      <a:r>
+                        <a:rPr lang="en-US" dirty="0"/>
+                        <a:t>0.0007</a:t>
+                      </a:r>
+                    </a:p>
+                  </a:txBody>
+                  <a:tcPr/>
+                </a:tc>
+                <a:extLst>
+                  <a:ext uri="{0D108BD9-81ED-4DB2-BD59-A6C34878D82A}">
+                    <a16:rowId xmlns:a16="http://schemas.microsoft.com/office/drawing/2014/main" val="3923023807"/>
+                  </a:ext>
+                </a:extLst>
+              </a:tr>
+              <a:tr h="370840">
+                <a:tc>
+                  <a:txBody>
+                    <a:bodyPr/>
+                    <a:lstStyle/>
+                    <a:p>
+                      <a:r>
+                        <a:rPr lang="en-US" dirty="0"/>
+                        <a:t>1.2</a:t>
+                      </a:r>
+                    </a:p>
+                  </a:txBody>
+                  <a:tcPr/>
+                </a:tc>
+                <a:tc>
+                  <a:txBody>
+                    <a:bodyPr/>
+                    <a:lstStyle/>
+                    <a:p>
+                      <a:r>
+                        <a:rPr lang="en-US" dirty="0"/>
+                        <a:t>0.008</a:t>
+                      </a:r>
+                    </a:p>
+                  </a:txBody>
+                  <a:tcPr/>
+                </a:tc>
+                <a:tc>
+                  <a:txBody>
+                    <a:bodyPr/>
+                    <a:lstStyle/>
+                    <a:p>
+                      <a:r>
+                        <a:rPr lang="en-US" dirty="0"/>
+                        <a:t>49</a:t>
+                      </a:r>
+                    </a:p>
+                  </a:txBody>
+                  <a:tcPr/>
+                </a:tc>
+                <a:tc>
+                  <a:txBody>
+                    <a:bodyPr/>
+                    <a:lstStyle/>
+                    <a:p>
+                      <a:r>
+                        <a:rPr lang="en-US" dirty="0"/>
+                        <a:t>0.38</a:t>
+                      </a:r>
+                    </a:p>
+                  </a:txBody>
+                  <a:tcPr/>
+                </a:tc>
+                <a:tc>
+                  <a:txBody>
+                    <a:bodyPr/>
+                    <a:lstStyle/>
+                    <a:p>
+                      <a:r>
+                        <a:rPr lang="en-US" dirty="0"/>
+                        <a:t>0.0345</a:t>
+                      </a:r>
+                    </a:p>
+                  </a:txBody>
+                  <a:tcPr/>
+                </a:tc>
+                <a:tc>
+                  <a:txBody>
+                    <a:bodyPr/>
+                    <a:lstStyle/>
+                    <a:p>
+                      <a:r>
+                        <a:rPr lang="en-US" dirty="0"/>
+                        <a:t>0.0023</a:t>
+                      </a:r>
+                    </a:p>
+                  </a:txBody>
+                  <a:tcPr/>
+                </a:tc>
+                <a:extLst>
+                  <a:ext uri="{0D108BD9-81ED-4DB2-BD59-A6C34878D82A}">
+                    <a16:rowId xmlns:a16="http://schemas.microsoft.com/office/drawing/2014/main" val="106791260"/>
+                  </a:ext>
+                </a:extLst>
+              </a:tr>
+              <a:tr h="370840">
+                <a:tc>
+                  <a:txBody>
+                    <a:bodyPr/>
+                    <a:lstStyle/>
+                    <a:p>
+                      <a:r>
+                        <a:rPr lang="en-US" dirty="0"/>
+                        <a:t>6</a:t>
+                      </a:r>
+                    </a:p>
+                  </a:txBody>
+                  <a:tcPr/>
+                </a:tc>
+                <a:tc>
+                  <a:txBody>
+                    <a:bodyPr/>
+                    <a:lstStyle/>
+                    <a:p>
+                      <a:r>
+                        <a:rPr lang="en-US" dirty="0"/>
+                        <a:t>0.008</a:t>
+                      </a:r>
+                    </a:p>
+                  </a:txBody>
+                  <a:tcPr/>
+                </a:tc>
+                <a:tc>
+                  <a:txBody>
+                    <a:bodyPr/>
+                    <a:lstStyle/>
+                    <a:p>
+                      <a:r>
+                        <a:rPr lang="en-US" dirty="0"/>
+                        <a:t>49</a:t>
+                      </a:r>
+                    </a:p>
+                  </a:txBody>
+                  <a:tcPr/>
+                </a:tc>
+                <a:tc>
+                  <a:txBody>
+                    <a:bodyPr/>
+                    <a:lstStyle/>
+                    <a:p>
+                      <a:r>
+                        <a:rPr lang="en-US" dirty="0"/>
+                        <a:t>0.38</a:t>
+                      </a:r>
+                    </a:p>
+                  </a:txBody>
+                  <a:tcPr/>
+                </a:tc>
+                <a:tc>
+                  <a:txBody>
+                    <a:bodyPr/>
+                    <a:lstStyle/>
+                    <a:p>
+                      <a:r>
+                        <a:rPr lang="en-US" dirty="0"/>
+                        <a:t>0.0395</a:t>
+                      </a:r>
+                    </a:p>
+                  </a:txBody>
+                  <a:tcPr/>
+                </a:tc>
+                <a:tc>
+                  <a:txBody>
+                    <a:bodyPr/>
+                    <a:lstStyle/>
+                    <a:p>
+                      <a:r>
+                        <a:rPr lang="en-US" dirty="0"/>
+                        <a:t>0.0063</a:t>
+                      </a:r>
+                    </a:p>
+                  </a:txBody>
+                  <a:tcPr/>
+                </a:tc>
+                <a:extLst>
+                  <a:ext uri="{0D108BD9-81ED-4DB2-BD59-A6C34878D82A}">
+                    <a16:rowId xmlns:a16="http://schemas.microsoft.com/office/drawing/2014/main" val="4202682201"/>
+                  </a:ext>
+                </a:extLst>
+              </a:tr>
+              <a:tr h="370840">
+                <a:tc>
+                  <a:txBody>
+                    <a:bodyPr/>
+                    <a:lstStyle/>
+                    <a:p>
+                      <a:r>
+                        <a:rPr lang="en-US" dirty="0"/>
+                        <a:t>0.5</a:t>
+                      </a:r>
+                    </a:p>
+                  </a:txBody>
+                  <a:tcPr/>
+                </a:tc>
+                <a:tc>
+                  <a:txBody>
+                    <a:bodyPr/>
+                    <a:lstStyle/>
+                    <a:p>
+                      <a:r>
+                        <a:rPr lang="en-US" dirty="0"/>
+                        <a:t>0.008</a:t>
+                      </a:r>
+                    </a:p>
+                  </a:txBody>
+                  <a:tcPr/>
+                </a:tc>
+                <a:tc>
+                  <a:txBody>
+                    <a:bodyPr/>
+                    <a:lstStyle/>
+                    <a:p>
+                      <a:r>
+                        <a:rPr lang="en-US" dirty="0"/>
+                        <a:t>49</a:t>
+                      </a:r>
+                    </a:p>
+                  </a:txBody>
+                  <a:tcPr/>
+                </a:tc>
+                <a:tc>
+                  <a:txBody>
+                    <a:bodyPr/>
+                    <a:lstStyle/>
+                    <a:p>
+                      <a:r>
+                        <a:rPr lang="en-US" dirty="0"/>
+                        <a:t>0.38</a:t>
+                      </a:r>
+                    </a:p>
+                  </a:txBody>
+                  <a:tcPr/>
+                </a:tc>
+                <a:tc>
+                  <a:txBody>
+                    <a:bodyPr/>
+                    <a:lstStyle/>
+                    <a:p>
+                      <a:r>
+                        <a:rPr lang="en-US" dirty="0"/>
+                        <a:t>0.0361</a:t>
+                      </a:r>
+                    </a:p>
+                  </a:txBody>
+                  <a:tcPr/>
+                </a:tc>
+                <a:tc>
+                  <a:txBody>
+                    <a:bodyPr/>
+                    <a:lstStyle/>
+                    <a:p>
+                      <a:r>
+                        <a:rPr lang="en-US" dirty="0"/>
+                        <a:t>0.0034</a:t>
+                      </a:r>
+                    </a:p>
+                  </a:txBody>
+                  <a:tcPr/>
+                </a:tc>
+                <a:extLst>
+                  <a:ext uri="{0D108BD9-81ED-4DB2-BD59-A6C34878D82A}">
+                    <a16:rowId xmlns:a16="http://schemas.microsoft.com/office/drawing/2014/main" val="1856997119"/>
+                  </a:ext>
+                </a:extLst>
+              </a:tr>
+              <a:tr h="370840">
+                <a:tc>
+                  <a:txBody>
+                    <a:bodyPr/>
+                    <a:lstStyle/>
+                    <a:p>
+                      <a:r>
+                        <a:rPr lang="en-US" dirty="0"/>
+                        <a:t>1.2</a:t>
+                      </a:r>
+                    </a:p>
+                  </a:txBody>
+                  <a:tcPr/>
+                </a:tc>
+                <a:tc>
+                  <a:txBody>
+                    <a:bodyPr/>
+                    <a:lstStyle/>
+                    <a:p>
+                      <a:r>
+                        <a:rPr lang="en-US" dirty="0"/>
+                        <a:t>0.008</a:t>
+                      </a:r>
+                    </a:p>
+                  </a:txBody>
+                  <a:tcPr/>
+                </a:tc>
+                <a:tc>
+                  <a:txBody>
+                    <a:bodyPr/>
+                    <a:lstStyle/>
+                    <a:p>
+                      <a:r>
+                        <a:rPr lang="en-US" dirty="0"/>
+                        <a:t>29</a:t>
+                      </a:r>
+                    </a:p>
+                  </a:txBody>
+                  <a:tcPr/>
+                </a:tc>
+                <a:tc>
+                  <a:txBody>
+                    <a:bodyPr/>
+                    <a:lstStyle/>
+                    <a:p>
+                      <a:r>
+                        <a:rPr lang="en-US" dirty="0"/>
+                        <a:t>0.22</a:t>
+                      </a:r>
+                    </a:p>
+                  </a:txBody>
+                  <a:tcPr/>
+                </a:tc>
+                <a:tc>
+                  <a:txBody>
+                    <a:bodyPr/>
+                    <a:lstStyle/>
+                    <a:p>
+                      <a:r>
+                        <a:rPr lang="en-US" dirty="0"/>
+                        <a:t>0.0131</a:t>
+                      </a:r>
+                    </a:p>
+                  </a:txBody>
+                  <a:tcPr/>
+                </a:tc>
+                <a:tc>
+                  <a:txBody>
+                    <a:bodyPr/>
+                    <a:lstStyle/>
+                    <a:p>
+                      <a:r>
+                        <a:rPr lang="en-US" dirty="0"/>
+                        <a:t>0.0011</a:t>
+                      </a:r>
+                    </a:p>
+                  </a:txBody>
+                  <a:tcPr/>
+                </a:tc>
+                <a:extLst>
+                  <a:ext uri="{0D108BD9-81ED-4DB2-BD59-A6C34878D82A}">
+                    <a16:rowId xmlns:a16="http://schemas.microsoft.com/office/drawing/2014/main" val="3137110190"/>
+                  </a:ext>
+                </a:extLst>
+              </a:tr>
+              <a:tr h="370840">
+                <a:tc>
+                  <a:txBody>
+                    <a:bodyPr/>
+                    <a:lstStyle/>
+                    <a:p>
+                      <a:r>
+                        <a:rPr lang="en-US" dirty="0"/>
+                        <a:t>3</a:t>
+                      </a:r>
+                    </a:p>
+                  </a:txBody>
+                  <a:tcPr/>
+                </a:tc>
+                <a:tc>
+                  <a:txBody>
+                    <a:bodyPr/>
+                    <a:lstStyle/>
+                    <a:p>
+                      <a:r>
+                        <a:rPr lang="en-US" dirty="0"/>
+                        <a:t>0.010</a:t>
+                      </a:r>
+                    </a:p>
+                  </a:txBody>
+                  <a:tcPr/>
+                </a:tc>
+                <a:tc>
+                  <a:txBody>
+                    <a:bodyPr/>
+                    <a:lstStyle/>
+                    <a:p>
+                      <a:r>
+                        <a:rPr lang="en-US" dirty="0"/>
+                        <a:t>29</a:t>
+                      </a:r>
+                    </a:p>
+                  </a:txBody>
+                  <a:tcPr/>
+                </a:tc>
+                <a:tc>
+                  <a:txBody>
+                    <a:bodyPr/>
+                    <a:lstStyle/>
+                    <a:p>
+                      <a:r>
+                        <a:rPr lang="en-US" dirty="0"/>
+                        <a:t>0.29</a:t>
+                      </a:r>
+                    </a:p>
+                  </a:txBody>
+                  <a:tcPr/>
+                </a:tc>
+                <a:tc>
+                  <a:txBody>
+                    <a:bodyPr/>
+                    <a:lstStyle/>
+                    <a:p>
+                      <a:r>
+                        <a:rPr lang="en-US" dirty="0"/>
+                        <a:t>0.0199</a:t>
+                      </a:r>
+                    </a:p>
+                  </a:txBody>
+                  <a:tcPr/>
+                </a:tc>
+                <a:tc>
+                  <a:txBody>
+                    <a:bodyPr/>
+                    <a:lstStyle/>
+                    <a:p>
+                      <a:r>
+                        <a:rPr lang="en-US" dirty="0"/>
+                        <a:t>0.0018</a:t>
+                      </a:r>
+                    </a:p>
+                  </a:txBody>
+                  <a:tcPr/>
+                </a:tc>
+                <a:extLst>
+                  <a:ext uri="{0D108BD9-81ED-4DB2-BD59-A6C34878D82A}">
+                    <a16:rowId xmlns:a16="http://schemas.microsoft.com/office/drawing/2014/main" val="922735852"/>
+                  </a:ext>
+                </a:extLst>
+              </a:tr>
+              <a:tr h="370840">
+                <a:tc>
+                  <a:txBody>
+                    <a:bodyPr/>
+                    <a:lstStyle/>
+                    <a:p>
+                      <a:r>
+                        <a:rPr lang="en-US" dirty="0"/>
+                        <a:t>3</a:t>
+                      </a:r>
+                    </a:p>
+                  </a:txBody>
+                  <a:tcPr/>
+                </a:tc>
+                <a:tc>
+                  <a:txBody>
+                    <a:bodyPr/>
+                    <a:lstStyle/>
+                    <a:p>
+                      <a:r>
+                        <a:rPr lang="en-US" dirty="0"/>
+                        <a:t>0.010</a:t>
+                      </a:r>
+                    </a:p>
+                  </a:txBody>
+                  <a:tcPr/>
+                </a:tc>
+                <a:tc>
+                  <a:txBody>
+                    <a:bodyPr/>
+                    <a:lstStyle/>
+                    <a:p>
+                      <a:r>
+                        <a:rPr lang="en-US" dirty="0"/>
+                        <a:t>79</a:t>
+                      </a:r>
+                    </a:p>
+                  </a:txBody>
+                  <a:tcPr/>
+                </a:tc>
+                <a:tc>
+                  <a:txBody>
+                    <a:bodyPr/>
+                    <a:lstStyle/>
+                    <a:p>
+                      <a:r>
+                        <a:rPr lang="en-US" dirty="0"/>
+                        <a:t>0.71</a:t>
+                      </a:r>
+                    </a:p>
+                  </a:txBody>
+                  <a:tcPr/>
+                </a:tc>
+                <a:tc>
+                  <a:txBody>
+                    <a:bodyPr/>
+                    <a:lstStyle/>
+                    <a:p>
+                      <a:r>
+                        <a:rPr lang="en-US" dirty="0"/>
+                        <a:t>0.1236</a:t>
+                      </a:r>
+                    </a:p>
+                  </a:txBody>
+                  <a:tcPr/>
+                </a:tc>
+                <a:tc>
+                  <a:txBody>
+                    <a:bodyPr/>
+                    <a:lstStyle/>
+                    <a:p>
+                      <a:r>
+                        <a:rPr lang="en-US" dirty="0"/>
+                        <a:t>0.0077</a:t>
+                      </a:r>
+                    </a:p>
+                  </a:txBody>
+                  <a:tcPr/>
+                </a:tc>
+                <a:extLst>
+                  <a:ext uri="{0D108BD9-81ED-4DB2-BD59-A6C34878D82A}">
+                    <a16:rowId xmlns:a16="http://schemas.microsoft.com/office/drawing/2014/main" val="767456597"/>
+                  </a:ext>
+                </a:extLst>
+              </a:tr>
+              <a:tr h="370840">
+                <a:tc>
+                  <a:txBody>
+                    <a:bodyPr/>
+                    <a:lstStyle/>
+                    <a:p>
+                      <a:endParaRPr lang="en-US"/>
+                    </a:p>
+                  </a:txBody>
+                  <a:tcPr/>
+                </a:tc>
+                <a:tc>
+                  <a:txBody>
+                    <a:bodyPr/>
+                    <a:lstStyle/>
+                    <a:p>
+                      <a:endParaRPr lang="en-US" dirty="0"/>
+                    </a:p>
+                  </a:txBody>
+                  <a:tcPr/>
+                </a:tc>
+                <a:tc>
+                  <a:txBody>
+                    <a:bodyPr/>
+                    <a:lstStyle/>
+                    <a:p>
+                      <a:endParaRPr lang="en-US" dirty="0"/>
+                    </a:p>
+                  </a:txBody>
+                  <a:tcPr/>
+                </a:tc>
+                <a:tc>
+                  <a:txBody>
+                    <a:bodyPr/>
+                    <a:lstStyle/>
+                    <a:p>
+                      <a:endParaRPr lang="en-US" dirty="0"/>
+                    </a:p>
+                  </a:txBody>
+                  <a:tcPr/>
+                </a:tc>
+                <a:tc>
+                  <a:txBody>
+                    <a:bodyPr/>
+                    <a:lstStyle/>
+                    <a:p>
+                      <a:endParaRPr lang="en-US"/>
+                    </a:p>
+                  </a:txBody>
+                  <a:tcPr/>
+                </a:tc>
+                <a:tc>
+                  <a:txBody>
+                    <a:bodyPr/>
+                    <a:lstStyle/>
+                    <a:p>
+                      <a:endParaRPr lang="en-US" dirty="0"/>
+                    </a:p>
+                  </a:txBody>
+                  <a:tcPr/>
+                </a:tc>
+                <a:extLst>
+                  <a:ext uri="{0D108BD9-81ED-4DB2-BD59-A6C34878D82A}">
+                    <a16:rowId xmlns:a16="http://schemas.microsoft.com/office/drawing/2014/main" val="1634594644"/>
+                  </a:ext>
+                </a:extLst>
+              </a:tr>
+            </a:tbl>
+          </a:graphicData>
+        </a:graphic>
+      </p:graphicFrame>
+      <p:sp>
+        <p:nvSpPr>
+          <p:cNvPr id="3" name="TextBox 2">
+            <a:extLst>
+              <a:ext uri="{FF2B5EF4-FFF2-40B4-BE49-F238E27FC236}">
+                <a16:creationId xmlns:a16="http://schemas.microsoft.com/office/drawing/2014/main" id="{69F69A4A-8F53-4B10-870B-9490EDE321E8}"/>
+              </a:ext>
+            </a:extLst>
+          </p:cNvPr>
+          <p:cNvSpPr txBox="1"/>
+          <p:nvPr/>
+        </p:nvSpPr>
+        <p:spPr>
+          <a:xfrm>
+            <a:off x="2032000" y="5203371"/>
+            <a:ext cx="6066971" cy="646331"/>
+          </a:xfrm>
+          <a:prstGeom prst="rect">
+            <a:avLst/>
+          </a:prstGeom>
+          <a:noFill/>
+        </p:spPr>
+        <p:txBody>
+          <a:bodyPr wrap="square" rtlCol="0">
+            <a:spAutoFit/>
+          </a:bodyPr>
+          <a:lstStyle/>
+          <a:p>
+            <a:r>
+              <a:rPr lang="en-US" dirty="0"/>
+              <a:t>How do we get back the applied amplitude if we know </a:t>
+            </a:r>
+            <a:r>
+              <a:rPr lang="en-US" dirty="0" err="1"/>
+              <a:t>Gx</a:t>
+            </a:r>
+            <a:r>
+              <a:rPr lang="en-US" dirty="0"/>
+              <a:t> and the </a:t>
+            </a:r>
+            <a:r>
+              <a:rPr lang="en-US"/>
+              <a:t>normalized power?</a:t>
+            </a:r>
+          </a:p>
+        </p:txBody>
+      </p:sp>
+    </p:spTree>
+    <p:extLst>
+      <p:ext uri="{BB962C8B-B14F-4D97-AF65-F5344CB8AC3E}">
+        <p14:creationId xmlns:p14="http://schemas.microsoft.com/office/powerpoint/2010/main" val="4008881854"/>
+      </p:ext>
+    </p:extLst>
+  </p:cSld>
+  <p:clrMapOvr>
+    <a:masterClrMapping/>
+  </p:clrMapOvr>
+</p:sld>
+</file>
+
+<file path=ppt/slides/slide9.xml><?xml version="1.0" encoding="utf-8"?>
+<p:sld xmlns:a="http://schemas.openxmlformats.org/drawingml/2006/main" xmlns:r="http://schemas.openxmlformats.org/officeDocument/2006/relationships" xmlns:p="http://schemas.openxmlformats.org/presentationml/2006/main">
+  <p:cSld>
+    <p:spTree>
+      <p:nvGrpSpPr>
+        <p:cNvPr id="1" name=""/>
+        <p:cNvGrpSpPr/>
+        <p:nvPr/>
+      </p:nvGrpSpPr>
+      <p:grpSpPr>
+        <a:xfrm>
+          <a:off x="0" y="0"/>
+          <a:ext cx="0" cy="0"/>
+          <a:chOff x="0" y="0"/>
+          <a:chExt cx="0" cy="0"/>
+        </a:xfrm>
+      </p:grpSpPr>
+      <p:sp>
+        <p:nvSpPr>
+          <p:cNvPr id="2" name="TextBox 1">
+            <a:extLst>
+              <a:ext uri="{FF2B5EF4-FFF2-40B4-BE49-F238E27FC236}">
+                <a16:creationId xmlns:a16="http://schemas.microsoft.com/office/drawing/2014/main" id="{0EC54AC5-8FA1-4523-BADA-8D3AEB64B513}"/>
+              </a:ext>
+            </a:extLst>
+          </p:cNvPr>
+          <p:cNvSpPr txBox="1"/>
+          <p:nvPr/>
+        </p:nvSpPr>
+        <p:spPr>
+          <a:xfrm>
+            <a:off x="774700" y="241300"/>
+            <a:ext cx="5930900" cy="1477328"/>
+          </a:xfrm>
+          <a:prstGeom prst="rect">
+            <a:avLst/>
+          </a:prstGeom>
+          <a:noFill/>
+        </p:spPr>
+        <p:txBody>
+          <a:bodyPr wrap="square" rtlCol="0">
+            <a:spAutoFit/>
+          </a:bodyPr>
+          <a:lstStyle/>
+          <a:p>
+            <a:r>
+              <a:rPr lang="en-US" dirty="0"/>
+              <a:t>Interestingly, once we start </a:t>
+            </a:r>
+            <a:r>
+              <a:rPr lang="en-US" dirty="0" err="1"/>
+              <a:t>overrotating</a:t>
+            </a:r>
+            <a:r>
+              <a:rPr lang="en-US" dirty="0"/>
+              <a:t> so much that an rotation intended to increase the 1-state probability actually decreases it (</a:t>
+            </a:r>
+            <a:r>
+              <a:rPr lang="en-US" dirty="0" err="1"/>
+              <a:t>overrotation</a:t>
+            </a:r>
+            <a:r>
+              <a:rPr lang="en-US" dirty="0"/>
+              <a:t> past pi), there is no longer a clear relationship between the normalized peak power and angle drift amplitude/max probability</a:t>
+            </a:r>
+          </a:p>
+        </p:txBody>
+      </p:sp>
+      <p:pic>
+        <p:nvPicPr>
+          <p:cNvPr id="3" name="Picture 2">
+            <a:extLst>
+              <a:ext uri="{FF2B5EF4-FFF2-40B4-BE49-F238E27FC236}">
+                <a16:creationId xmlns:a16="http://schemas.microsoft.com/office/drawing/2014/main" id="{A5678223-D68B-4D58-ABB7-D789538F0C0E}"/>
+              </a:ext>
+            </a:extLst>
+          </p:cNvPr>
+          <p:cNvPicPr>
+            <a:picLocks noChangeAspect="1"/>
+          </p:cNvPicPr>
+          <p:nvPr/>
+        </p:nvPicPr>
+        <p:blipFill>
+          <a:blip r:embed="rId2"/>
+          <a:stretch>
+            <a:fillRect/>
+          </a:stretch>
+        </p:blipFill>
+        <p:spPr>
+          <a:xfrm>
+            <a:off x="6705600" y="241300"/>
+            <a:ext cx="4940300" cy="3396456"/>
+          </a:xfrm>
+          <a:prstGeom prst="rect">
+            <a:avLst/>
+          </a:prstGeom>
+        </p:spPr>
+      </p:pic>
+      <p:pic>
+        <p:nvPicPr>
+          <p:cNvPr id="4" name="Picture 3">
+            <a:extLst>
+              <a:ext uri="{FF2B5EF4-FFF2-40B4-BE49-F238E27FC236}">
+                <a16:creationId xmlns:a16="http://schemas.microsoft.com/office/drawing/2014/main" id="{17198A3C-7308-4007-9923-AAED70B64CA4}"/>
+              </a:ext>
+            </a:extLst>
+          </p:cNvPr>
+          <p:cNvPicPr>
+            <a:picLocks noChangeAspect="1"/>
+          </p:cNvPicPr>
+          <p:nvPr/>
+        </p:nvPicPr>
+        <p:blipFill>
+          <a:blip r:embed="rId3"/>
+          <a:stretch>
+            <a:fillRect/>
+          </a:stretch>
+        </p:blipFill>
+        <p:spPr>
+          <a:xfrm>
+            <a:off x="7045324" y="3637756"/>
+            <a:ext cx="4473575" cy="3036412"/>
+          </a:xfrm>
+          <a:prstGeom prst="rect">
+            <a:avLst/>
+          </a:prstGeom>
+        </p:spPr>
+      </p:pic>
+    </p:spTree>
+    <p:extLst>
+      <p:ext uri="{BB962C8B-B14F-4D97-AF65-F5344CB8AC3E}">
+        <p14:creationId xmlns:p14="http://schemas.microsoft.com/office/powerpoint/2010/main" val="3233372949"/>
       </p:ext>
     </p:extLst>
   </p:cSld>

</xml_diff>